<commit_message>
Add a GoBack event in order to go back to template selection from app create form
</commit_message>
<xml_diff>
--- a/alien4cloud-wizard-ui/doc/WIzardStateMachine.pptx
+++ b/alien4cloud-wizard-ui/doc/WIzardStateMachine.pptx
@@ -261,7 +261,7 @@
           <a:p>
             <a:fld id="{78A2FE73-68E3-7348-8EDE-3D64981CCA47}" type="datetimeFigureOut">
               <a:rPr lang="fr-FR" smtClean="0"/>
-              <a:t>21/07/2019</a:t>
+              <a:t>22/07/2019</a:t>
             </a:fld>
             <a:endParaRPr lang="fr-FR"/>
           </a:p>
@@ -434,7 +434,7 @@
           <a:p>
             <a:fld id="{78A2FE73-68E3-7348-8EDE-3D64981CCA47}" type="datetimeFigureOut">
               <a:rPr lang="fr-FR" smtClean="0"/>
-              <a:t>21/07/2019</a:t>
+              <a:t>22/07/2019</a:t>
             </a:fld>
             <a:endParaRPr lang="fr-FR"/>
           </a:p>
@@ -617,7 +617,7 @@
           <a:p>
             <a:fld id="{78A2FE73-68E3-7348-8EDE-3D64981CCA47}" type="datetimeFigureOut">
               <a:rPr lang="fr-FR" smtClean="0"/>
-              <a:t>21/07/2019</a:t>
+              <a:t>22/07/2019</a:t>
             </a:fld>
             <a:endParaRPr lang="fr-FR"/>
           </a:p>
@@ -790,7 +790,7 @@
           <a:p>
             <a:fld id="{78A2FE73-68E3-7348-8EDE-3D64981CCA47}" type="datetimeFigureOut">
               <a:rPr lang="fr-FR" smtClean="0"/>
-              <a:t>21/07/2019</a:t>
+              <a:t>22/07/2019</a:t>
             </a:fld>
             <a:endParaRPr lang="fr-FR"/>
           </a:p>
@@ -1068,7 +1068,7 @@
           <a:p>
             <a:fld id="{78A2FE73-68E3-7348-8EDE-3D64981CCA47}" type="datetimeFigureOut">
               <a:rPr lang="fr-FR" smtClean="0"/>
-              <a:t>21/07/2019</a:t>
+              <a:t>22/07/2019</a:t>
             </a:fld>
             <a:endParaRPr lang="fr-FR"/>
           </a:p>
@@ -1283,7 +1283,7 @@
           <a:p>
             <a:fld id="{78A2FE73-68E3-7348-8EDE-3D64981CCA47}" type="datetimeFigureOut">
               <a:rPr lang="fr-FR" smtClean="0"/>
-              <a:t>21/07/2019</a:t>
+              <a:t>22/07/2019</a:t>
             </a:fld>
             <a:endParaRPr lang="fr-FR"/>
           </a:p>
@@ -1651,7 +1651,7 @@
           <a:p>
             <a:fld id="{78A2FE73-68E3-7348-8EDE-3D64981CCA47}" type="datetimeFigureOut">
               <a:rPr lang="fr-FR" smtClean="0"/>
-              <a:t>21/07/2019</a:t>
+              <a:t>22/07/2019</a:t>
             </a:fld>
             <a:endParaRPr lang="fr-FR"/>
           </a:p>
@@ -1792,7 +1792,7 @@
           <a:p>
             <a:fld id="{78A2FE73-68E3-7348-8EDE-3D64981CCA47}" type="datetimeFigureOut">
               <a:rPr lang="fr-FR" smtClean="0"/>
-              <a:t>21/07/2019</a:t>
+              <a:t>22/07/2019</a:t>
             </a:fld>
             <a:endParaRPr lang="fr-FR"/>
           </a:p>
@@ -1905,7 +1905,7 @@
           <a:p>
             <a:fld id="{78A2FE73-68E3-7348-8EDE-3D64981CCA47}" type="datetimeFigureOut">
               <a:rPr lang="fr-FR" smtClean="0"/>
-              <a:t>21/07/2019</a:t>
+              <a:t>22/07/2019</a:t>
             </a:fld>
             <a:endParaRPr lang="fr-FR"/>
           </a:p>
@@ -2194,7 +2194,7 @@
           <a:p>
             <a:fld id="{78A2FE73-68E3-7348-8EDE-3D64981CCA47}" type="datetimeFigureOut">
               <a:rPr lang="fr-FR" smtClean="0"/>
-              <a:t>21/07/2019</a:t>
+              <a:t>22/07/2019</a:t>
             </a:fld>
             <a:endParaRPr lang="fr-FR"/>
           </a:p>
@@ -2485,7 +2485,7 @@
           <a:p>
             <a:fld id="{78A2FE73-68E3-7348-8EDE-3D64981CCA47}" type="datetimeFigureOut">
               <a:rPr lang="fr-FR" smtClean="0"/>
-              <a:t>21/07/2019</a:t>
+              <a:t>22/07/2019</a:t>
             </a:fld>
             <a:endParaRPr lang="fr-FR"/>
           </a:p>
@@ -2701,7 +2701,7 @@
           <a:p>
             <a:fld id="{78A2FE73-68E3-7348-8EDE-3D64981CCA47}" type="datetimeFigureOut">
               <a:rPr lang="fr-FR" smtClean="0"/>
-              <a:t>21/07/2019</a:t>
+              <a:t>22/07/2019</a:t>
             </a:fld>
             <a:endParaRPr lang="fr-FR"/>
           </a:p>
@@ -3417,7 +3417,7 @@
         </p:nvSpPr>
         <p:spPr>
           <a:xfrm>
-            <a:off x="2479665" y="1786360"/>
+            <a:off x="1119611" y="1806188"/>
             <a:ext cx="1253869" cy="253916"/>
           </a:xfrm>
           <a:prstGeom prst="rect">
@@ -6280,7 +6280,7 @@
         <p:spPr>
           <a:xfrm>
             <a:off x="6826724" y="1750963"/>
-            <a:ext cx="758541" cy="253916"/>
+            <a:ext cx="655949" cy="253916"/>
           </a:xfrm>
           <a:prstGeom prst="rect">
             <a:avLst/>
@@ -6294,14 +6294,18 @@
           <a:lstStyle/>
           <a:p>
             <a:r>
-              <a:rPr lang="fr-FR" sz="1050" dirty="0" err="1"/>
-              <a:t>goUpade</a:t>
-            </a:r>
-            <a:r>
-              <a:rPr lang="fr-FR" sz="1050" dirty="0"/>
+              <a:rPr lang="fr-FR" sz="1050" dirty="0" err="1">
+                <a:solidFill>
+                  <a:schemeClr val="accent1"/>
+                </a:solidFill>
+              </a:rPr>
+              <a:t>goBack</a:t>
+            </a:r>
+            <a:r>
+              <a:rPr lang="fr-FR" sz="1050"/>
               <a:t>()</a:t>
             </a:r>
-            <a:endParaRPr lang="fr-FR" dirty="0"/>
+            <a:endParaRPr lang="fr-FR" sz="1050" dirty="0"/>
           </a:p>
         </p:txBody>
       </p:sp>
@@ -6320,7 +6324,7 @@
         <p:spPr>
           <a:xfrm>
             <a:off x="6697724" y="3666508"/>
-            <a:ext cx="758541" cy="253916"/>
+            <a:ext cx="655949" cy="253916"/>
           </a:xfrm>
           <a:prstGeom prst="rect">
             <a:avLst/>
@@ -6334,14 +6338,17 @@
           <a:lstStyle/>
           <a:p>
             <a:r>
-              <a:rPr lang="fr-FR" sz="1050" dirty="0" err="1"/>
-              <a:t>goUpade</a:t>
+              <a:rPr lang="fr-FR" sz="1050" dirty="0" err="1">
+                <a:solidFill>
+                  <a:schemeClr val="accent1"/>
+                </a:solidFill>
+              </a:rPr>
+              <a:t>goBack</a:t>
             </a:r>
             <a:r>
               <a:rPr lang="fr-FR" sz="1050" dirty="0"/>
               <a:t>()</a:t>
             </a:r>
-            <a:endParaRPr lang="fr-FR" dirty="0"/>
           </a:p>
         </p:txBody>
       </p:sp>
@@ -6699,6 +6706,96 @@
                 </a:solidFill>
               </a:rPr>
               <a:t>init</a:t>
+            </a:r>
+            <a:r>
+              <a:rPr lang="fr-FR" sz="1050" dirty="0"/>
+              <a:t>()</a:t>
+            </a:r>
+            <a:endParaRPr lang="fr-FR" dirty="0"/>
+          </a:p>
+        </p:txBody>
+      </p:sp>
+      <p:cxnSp>
+        <p:nvCxnSpPr>
+          <p:cNvPr id="77" name="Connecteur en arc 76">
+            <a:hlinkClick r:id="rId2"/>
+            <a:extLst>
+              <a:ext uri="{FF2B5EF4-FFF2-40B4-BE49-F238E27FC236}">
+                <a16:creationId xmlns:a16="http://schemas.microsoft.com/office/drawing/2014/main" id="{5071FAC8-7DFB-6C45-82B0-ED7CDEDFD4E7}"/>
+              </a:ext>
+            </a:extLst>
+          </p:cNvPr>
+          <p:cNvCxnSpPr>
+            <a:cxnSpLocks/>
+            <a:stCxn id="22" idx="3"/>
+            <a:endCxn id="16" idx="3"/>
+          </p:cNvCxnSpPr>
+          <p:nvPr/>
+        </p:nvCxnSpPr>
+        <p:spPr>
+          <a:xfrm flipH="1" flipV="1">
+            <a:off x="3106601" y="1459457"/>
+            <a:ext cx="925341" cy="1887916"/>
+          </a:xfrm>
+          <a:prstGeom prst="curvedConnector3">
+            <a:avLst>
+              <a:gd name="adj1" fmla="val -4750"/>
+            </a:avLst>
+          </a:prstGeom>
+          <a:ln>
+            <a:tailEnd type="triangle"/>
+          </a:ln>
+        </p:spPr>
+        <p:style>
+          <a:lnRef idx="1">
+            <a:schemeClr val="accent1"/>
+          </a:lnRef>
+          <a:fillRef idx="0">
+            <a:schemeClr val="accent1"/>
+          </a:fillRef>
+          <a:effectRef idx="0">
+            <a:schemeClr val="accent1"/>
+          </a:effectRef>
+          <a:fontRef idx="minor">
+            <a:schemeClr val="tx1"/>
+          </a:fontRef>
+        </p:style>
+      </p:cxnSp>
+      <p:sp>
+        <p:nvSpPr>
+          <p:cNvPr id="78" name="ZoneTexte 77">
+            <a:extLst>
+              <a:ext uri="{FF2B5EF4-FFF2-40B4-BE49-F238E27FC236}">
+                <a16:creationId xmlns:a16="http://schemas.microsoft.com/office/drawing/2014/main" id="{4A4FE6ED-0115-8E49-9A19-75FC2955EF33}"/>
+              </a:ext>
+            </a:extLst>
+          </p:cNvPr>
+          <p:cNvSpPr txBox="1"/>
+          <p:nvPr/>
+        </p:nvSpPr>
+        <p:spPr>
+          <a:xfrm>
+            <a:off x="3182043" y="1761179"/>
+            <a:ext cx="655949" cy="253916"/>
+          </a:xfrm>
+          <a:prstGeom prst="rect">
+            <a:avLst/>
+          </a:prstGeom>
+          <a:noFill/>
+        </p:spPr>
+        <p:txBody>
+          <a:bodyPr wrap="none" rtlCol="0">
+            <a:spAutoFit/>
+          </a:bodyPr>
+          <a:lstStyle/>
+          <a:p>
+            <a:r>
+              <a:rPr lang="fr-FR" sz="1050" dirty="0" err="1">
+                <a:solidFill>
+                  <a:schemeClr val="accent1"/>
+                </a:solidFill>
+              </a:rPr>
+              <a:t>goBack</a:t>
             </a:r>
             <a:r>
               <a:rPr lang="fr-FR" sz="1050" dirty="0"/>

</xml_diff>

<commit_message>
complete the generic service implementation so that it can now handle parametrized urls add a steps in the FSM in order to retrieve environments, if we only have one, auto select it
</commit_message>
<xml_diff>
--- a/alien4cloud-wizard-ui/doc/WIzardStateMachine.pptx
+++ b/alien4cloud-wizard-ui/doc/WIzardStateMachine.pptx
@@ -4,6 +4,9 @@
   <p:sldMasterIdLst>
     <p:sldMasterId id="2147483648" r:id="rId1"/>
   </p:sldMasterIdLst>
+  <p:notesMasterIdLst>
+    <p:notesMasterId r:id="rId7"/>
+  </p:notesMasterIdLst>
   <p:sldIdLst>
     <p:sldId id="258" r:id="rId2"/>
     <p:sldId id="256" r:id="rId3"/>
@@ -116,6 +119,414 @@
 </p:presentation>
 </file>
 
+<file path=ppt/notesMasters/notesMaster1.xml><?xml version="1.0" encoding="utf-8"?>
+<p:notesMaster xmlns:a="http://schemas.openxmlformats.org/drawingml/2006/main" xmlns:r="http://schemas.openxmlformats.org/officeDocument/2006/relationships" xmlns:p="http://schemas.openxmlformats.org/presentationml/2006/main">
+  <p:cSld>
+    <p:bg>
+      <p:bgRef idx="1001">
+        <a:schemeClr val="bg1"/>
+      </p:bgRef>
+    </p:bg>
+    <p:spTree>
+      <p:nvGrpSpPr>
+        <p:cNvPr id="1" name=""/>
+        <p:cNvGrpSpPr/>
+        <p:nvPr/>
+      </p:nvGrpSpPr>
+      <p:grpSpPr>
+        <a:xfrm>
+          <a:off x="0" y="0"/>
+          <a:ext cx="0" cy="0"/>
+          <a:chOff x="0" y="0"/>
+          <a:chExt cx="0" cy="0"/>
+        </a:xfrm>
+      </p:grpSpPr>
+      <p:sp>
+        <p:nvSpPr>
+          <p:cNvPr id="2" name="Espace réservé de l'en-tête 1"/>
+          <p:cNvSpPr>
+            <a:spLocks noGrp="1"/>
+          </p:cNvSpPr>
+          <p:nvPr>
+            <p:ph type="hdr" sz="quarter"/>
+          </p:nvPr>
+        </p:nvSpPr>
+        <p:spPr>
+          <a:xfrm>
+            <a:off x="0" y="0"/>
+            <a:ext cx="2971800" cy="458788"/>
+          </a:xfrm>
+          <a:prstGeom prst="rect">
+            <a:avLst/>
+          </a:prstGeom>
+        </p:spPr>
+        <p:txBody>
+          <a:bodyPr vert="horz" lIns="91440" tIns="45720" rIns="91440" bIns="45720" rtlCol="0"/>
+          <a:lstStyle>
+            <a:lvl1pPr algn="l">
+              <a:defRPr sz="1200"/>
+            </a:lvl1pPr>
+          </a:lstStyle>
+          <a:p>
+            <a:endParaRPr lang="fr-FR"/>
+          </a:p>
+        </p:txBody>
+      </p:sp>
+      <p:sp>
+        <p:nvSpPr>
+          <p:cNvPr id="3" name="Espace réservé de la date 2"/>
+          <p:cNvSpPr>
+            <a:spLocks noGrp="1"/>
+          </p:cNvSpPr>
+          <p:nvPr>
+            <p:ph type="dt" idx="1"/>
+          </p:nvPr>
+        </p:nvSpPr>
+        <p:spPr>
+          <a:xfrm>
+            <a:off x="3884613" y="0"/>
+            <a:ext cx="2971800" cy="458788"/>
+          </a:xfrm>
+          <a:prstGeom prst="rect">
+            <a:avLst/>
+          </a:prstGeom>
+        </p:spPr>
+        <p:txBody>
+          <a:bodyPr vert="horz" lIns="91440" tIns="45720" rIns="91440" bIns="45720" rtlCol="0"/>
+          <a:lstStyle>
+            <a:lvl1pPr algn="r">
+              <a:defRPr sz="1200"/>
+            </a:lvl1pPr>
+          </a:lstStyle>
+          <a:p>
+            <a:fld id="{F6E79B73-13D3-BE4E-A3AD-372256EFFFA4}" type="datetimeFigureOut">
+              <a:rPr lang="fr-FR" smtClean="0"/>
+              <a:t>26/07/2019</a:t>
+            </a:fld>
+            <a:endParaRPr lang="fr-FR"/>
+          </a:p>
+        </p:txBody>
+      </p:sp>
+      <p:sp>
+        <p:nvSpPr>
+          <p:cNvPr id="4" name="Espace réservé de l'image des diapositives 3"/>
+          <p:cNvSpPr>
+            <a:spLocks noGrp="1" noRot="1" noChangeAspect="1"/>
+          </p:cNvSpPr>
+          <p:nvPr>
+            <p:ph type="sldImg" idx="2"/>
+          </p:nvPr>
+        </p:nvSpPr>
+        <p:spPr>
+          <a:xfrm>
+            <a:off x="685800" y="1143000"/>
+            <a:ext cx="5486400" cy="3086100"/>
+          </a:xfrm>
+          <a:prstGeom prst="rect">
+            <a:avLst/>
+          </a:prstGeom>
+          <a:noFill/>
+          <a:ln w="12700">
+            <a:solidFill>
+              <a:prstClr val="black"/>
+            </a:solidFill>
+          </a:ln>
+        </p:spPr>
+        <p:txBody>
+          <a:bodyPr vert="horz" lIns="91440" tIns="45720" rIns="91440" bIns="45720" rtlCol="0" anchor="ctr"/>
+          <a:lstStyle/>
+          <a:p>
+            <a:endParaRPr lang="fr-FR"/>
+          </a:p>
+        </p:txBody>
+      </p:sp>
+      <p:sp>
+        <p:nvSpPr>
+          <p:cNvPr id="5" name="Espace réservé des notes 4"/>
+          <p:cNvSpPr>
+            <a:spLocks noGrp="1"/>
+          </p:cNvSpPr>
+          <p:nvPr>
+            <p:ph type="body" sz="quarter" idx="3"/>
+          </p:nvPr>
+        </p:nvSpPr>
+        <p:spPr>
+          <a:xfrm>
+            <a:off x="685800" y="4400550"/>
+            <a:ext cx="5486400" cy="3600450"/>
+          </a:xfrm>
+          <a:prstGeom prst="rect">
+            <a:avLst/>
+          </a:prstGeom>
+        </p:spPr>
+        <p:txBody>
+          <a:bodyPr vert="horz" lIns="91440" tIns="45720" rIns="91440" bIns="45720" rtlCol="0"/>
+          <a:lstStyle/>
+          <a:p>
+            <a:r>
+              <a:rPr lang="fr-FR"/>
+              <a:t>Modifier les styles du texte du masque
+Deuxième niveau
+Troisième niveau
+Quatrième niveau
+Cinquième niveau</a:t>
+            </a:r>
+          </a:p>
+        </p:txBody>
+      </p:sp>
+      <p:sp>
+        <p:nvSpPr>
+          <p:cNvPr id="6" name="Espace réservé du pied de page 5"/>
+          <p:cNvSpPr>
+            <a:spLocks noGrp="1"/>
+          </p:cNvSpPr>
+          <p:nvPr>
+            <p:ph type="ftr" sz="quarter" idx="4"/>
+          </p:nvPr>
+        </p:nvSpPr>
+        <p:spPr>
+          <a:xfrm>
+            <a:off x="0" y="8685213"/>
+            <a:ext cx="2971800" cy="458787"/>
+          </a:xfrm>
+          <a:prstGeom prst="rect">
+            <a:avLst/>
+          </a:prstGeom>
+        </p:spPr>
+        <p:txBody>
+          <a:bodyPr vert="horz" lIns="91440" tIns="45720" rIns="91440" bIns="45720" rtlCol="0" anchor="b"/>
+          <a:lstStyle>
+            <a:lvl1pPr algn="l">
+              <a:defRPr sz="1200"/>
+            </a:lvl1pPr>
+          </a:lstStyle>
+          <a:p>
+            <a:endParaRPr lang="fr-FR"/>
+          </a:p>
+        </p:txBody>
+      </p:sp>
+      <p:sp>
+        <p:nvSpPr>
+          <p:cNvPr id="7" name="Espace réservé du numéro de diapositive 6"/>
+          <p:cNvSpPr>
+            <a:spLocks noGrp="1"/>
+          </p:cNvSpPr>
+          <p:nvPr>
+            <p:ph type="sldNum" sz="quarter" idx="5"/>
+          </p:nvPr>
+        </p:nvSpPr>
+        <p:spPr>
+          <a:xfrm>
+            <a:off x="3884613" y="8685213"/>
+            <a:ext cx="2971800" cy="458787"/>
+          </a:xfrm>
+          <a:prstGeom prst="rect">
+            <a:avLst/>
+          </a:prstGeom>
+        </p:spPr>
+        <p:txBody>
+          <a:bodyPr vert="horz" lIns="91440" tIns="45720" rIns="91440" bIns="45720" rtlCol="0" anchor="b"/>
+          <a:lstStyle>
+            <a:lvl1pPr algn="r">
+              <a:defRPr sz="1200"/>
+            </a:lvl1pPr>
+          </a:lstStyle>
+          <a:p>
+            <a:fld id="{CEC15781-F568-F845-AF4C-399517709CA3}" type="slidenum">
+              <a:rPr lang="fr-FR" smtClean="0"/>
+              <a:t>‹N°›</a:t>
+            </a:fld>
+            <a:endParaRPr lang="fr-FR"/>
+          </a:p>
+        </p:txBody>
+      </p:sp>
+    </p:spTree>
+    <p:extLst>
+      <p:ext uri="{BB962C8B-B14F-4D97-AF65-F5344CB8AC3E}">
+        <p14:creationId xmlns:p14="http://schemas.microsoft.com/office/powerpoint/2010/main" val="3018223778"/>
+      </p:ext>
+    </p:extLst>
+  </p:cSld>
+  <p:clrMap bg1="lt1" tx1="dk1" bg2="lt2" tx2="dk2" accent1="accent1" accent2="accent2" accent3="accent3" accent4="accent4" accent5="accent5" accent6="accent6" hlink="hlink" folHlink="folHlink"/>
+  <p:notesStyle>
+    <a:lvl1pPr marL="0" algn="l" defTabSz="914400" rtl="0" eaLnBrk="1" latinLnBrk="0" hangingPunct="1">
+      <a:defRPr sz="1200" kern="1200">
+        <a:solidFill>
+          <a:schemeClr val="tx1"/>
+        </a:solidFill>
+        <a:latin typeface="+mn-lt"/>
+        <a:ea typeface="+mn-ea"/>
+        <a:cs typeface="+mn-cs"/>
+      </a:defRPr>
+    </a:lvl1pPr>
+    <a:lvl2pPr marL="457200" algn="l" defTabSz="914400" rtl="0" eaLnBrk="1" latinLnBrk="0" hangingPunct="1">
+      <a:defRPr sz="1200" kern="1200">
+        <a:solidFill>
+          <a:schemeClr val="tx1"/>
+        </a:solidFill>
+        <a:latin typeface="+mn-lt"/>
+        <a:ea typeface="+mn-ea"/>
+        <a:cs typeface="+mn-cs"/>
+      </a:defRPr>
+    </a:lvl2pPr>
+    <a:lvl3pPr marL="914400" algn="l" defTabSz="914400" rtl="0" eaLnBrk="1" latinLnBrk="0" hangingPunct="1">
+      <a:defRPr sz="1200" kern="1200">
+        <a:solidFill>
+          <a:schemeClr val="tx1"/>
+        </a:solidFill>
+        <a:latin typeface="+mn-lt"/>
+        <a:ea typeface="+mn-ea"/>
+        <a:cs typeface="+mn-cs"/>
+      </a:defRPr>
+    </a:lvl3pPr>
+    <a:lvl4pPr marL="1371600" algn="l" defTabSz="914400" rtl="0" eaLnBrk="1" latinLnBrk="0" hangingPunct="1">
+      <a:defRPr sz="1200" kern="1200">
+        <a:solidFill>
+          <a:schemeClr val="tx1"/>
+        </a:solidFill>
+        <a:latin typeface="+mn-lt"/>
+        <a:ea typeface="+mn-ea"/>
+        <a:cs typeface="+mn-cs"/>
+      </a:defRPr>
+    </a:lvl4pPr>
+    <a:lvl5pPr marL="1828800" algn="l" defTabSz="914400" rtl="0" eaLnBrk="1" latinLnBrk="0" hangingPunct="1">
+      <a:defRPr sz="1200" kern="1200">
+        <a:solidFill>
+          <a:schemeClr val="tx1"/>
+        </a:solidFill>
+        <a:latin typeface="+mn-lt"/>
+        <a:ea typeface="+mn-ea"/>
+        <a:cs typeface="+mn-cs"/>
+      </a:defRPr>
+    </a:lvl5pPr>
+    <a:lvl6pPr marL="2286000" algn="l" defTabSz="914400" rtl="0" eaLnBrk="1" latinLnBrk="0" hangingPunct="1">
+      <a:defRPr sz="1200" kern="1200">
+        <a:solidFill>
+          <a:schemeClr val="tx1"/>
+        </a:solidFill>
+        <a:latin typeface="+mn-lt"/>
+        <a:ea typeface="+mn-ea"/>
+        <a:cs typeface="+mn-cs"/>
+      </a:defRPr>
+    </a:lvl6pPr>
+    <a:lvl7pPr marL="2743200" algn="l" defTabSz="914400" rtl="0" eaLnBrk="1" latinLnBrk="0" hangingPunct="1">
+      <a:defRPr sz="1200" kern="1200">
+        <a:solidFill>
+          <a:schemeClr val="tx1"/>
+        </a:solidFill>
+        <a:latin typeface="+mn-lt"/>
+        <a:ea typeface="+mn-ea"/>
+        <a:cs typeface="+mn-cs"/>
+      </a:defRPr>
+    </a:lvl7pPr>
+    <a:lvl8pPr marL="3200400" algn="l" defTabSz="914400" rtl="0" eaLnBrk="1" latinLnBrk="0" hangingPunct="1">
+      <a:defRPr sz="1200" kern="1200">
+        <a:solidFill>
+          <a:schemeClr val="tx1"/>
+        </a:solidFill>
+        <a:latin typeface="+mn-lt"/>
+        <a:ea typeface="+mn-ea"/>
+        <a:cs typeface="+mn-cs"/>
+      </a:defRPr>
+    </a:lvl8pPr>
+    <a:lvl9pPr marL="3657600" algn="l" defTabSz="914400" rtl="0" eaLnBrk="1" latinLnBrk="0" hangingPunct="1">
+      <a:defRPr sz="1200" kern="1200">
+        <a:solidFill>
+          <a:schemeClr val="tx1"/>
+        </a:solidFill>
+        <a:latin typeface="+mn-lt"/>
+        <a:ea typeface="+mn-ea"/>
+        <a:cs typeface="+mn-cs"/>
+      </a:defRPr>
+    </a:lvl9pPr>
+  </p:notesStyle>
+</p:notesMaster>
+</file>
+
+<file path=ppt/notesSlides/notesSlide1.xml><?xml version="1.0" encoding="utf-8"?>
+<p:notes xmlns:a="http://schemas.openxmlformats.org/drawingml/2006/main" xmlns:r="http://schemas.openxmlformats.org/officeDocument/2006/relationships" xmlns:p="http://schemas.openxmlformats.org/presentationml/2006/main">
+  <p:cSld>
+    <p:spTree>
+      <p:nvGrpSpPr>
+        <p:cNvPr id="1" name=""/>
+        <p:cNvGrpSpPr/>
+        <p:nvPr/>
+      </p:nvGrpSpPr>
+      <p:grpSpPr>
+        <a:xfrm>
+          <a:off x="0" y="0"/>
+          <a:ext cx="0" cy="0"/>
+          <a:chOff x="0" y="0"/>
+          <a:chExt cx="0" cy="0"/>
+        </a:xfrm>
+      </p:grpSpPr>
+      <p:sp>
+        <p:nvSpPr>
+          <p:cNvPr id="2" name="Espace réservé de l'image des diapositives 1"/>
+          <p:cNvSpPr>
+            <a:spLocks noGrp="1" noRot="1" noChangeAspect="1"/>
+          </p:cNvSpPr>
+          <p:nvPr>
+            <p:ph type="sldImg"/>
+          </p:nvPr>
+        </p:nvSpPr>
+        <p:spPr/>
+      </p:sp>
+      <p:sp>
+        <p:nvSpPr>
+          <p:cNvPr id="3" name="Espace réservé des notes 2"/>
+          <p:cNvSpPr>
+            <a:spLocks noGrp="1"/>
+          </p:cNvSpPr>
+          <p:nvPr>
+            <p:ph type="body" idx="1"/>
+          </p:nvPr>
+        </p:nvSpPr>
+        <p:spPr/>
+        <p:txBody>
+          <a:bodyPr/>
+          <a:lstStyle/>
+          <a:p>
+            <a:endParaRPr lang="fr-FR" dirty="0"/>
+          </a:p>
+        </p:txBody>
+      </p:sp>
+      <p:sp>
+        <p:nvSpPr>
+          <p:cNvPr id="4" name="Espace réservé du numéro de diapositive 3"/>
+          <p:cNvSpPr>
+            <a:spLocks noGrp="1"/>
+          </p:cNvSpPr>
+          <p:nvPr>
+            <p:ph type="sldNum" sz="quarter" idx="5"/>
+          </p:nvPr>
+        </p:nvSpPr>
+        <p:spPr/>
+        <p:txBody>
+          <a:bodyPr/>
+          <a:lstStyle/>
+          <a:p>
+            <a:fld id="{CEC15781-F568-F845-AF4C-399517709CA3}" type="slidenum">
+              <a:rPr lang="fr-FR" smtClean="0"/>
+              <a:t>2</a:t>
+            </a:fld>
+            <a:endParaRPr lang="fr-FR"/>
+          </a:p>
+        </p:txBody>
+      </p:sp>
+    </p:spTree>
+    <p:extLst>
+      <p:ext uri="{BB962C8B-B14F-4D97-AF65-F5344CB8AC3E}">
+        <p14:creationId xmlns:p14="http://schemas.microsoft.com/office/powerpoint/2010/main" val="2197931650"/>
+      </p:ext>
+    </p:extLst>
+  </p:cSld>
+  <p:clrMapOvr>
+    <a:masterClrMapping/>
+  </p:clrMapOvr>
+</p:notes>
+</file>
+
 <file path=ppt/slideLayouts/slideLayout1.xml><?xml version="1.0" encoding="utf-8"?>
 <p:sldLayout xmlns:a="http://schemas.openxmlformats.org/drawingml/2006/main" xmlns:r="http://schemas.openxmlformats.org/officeDocument/2006/relationships" xmlns:p="http://schemas.openxmlformats.org/presentationml/2006/main" type="title" preserve="1">
   <p:cSld name="Diapositive de titre">
@@ -263,7 +674,7 @@
           <a:p>
             <a:fld id="{78A2FE73-68E3-7348-8EDE-3D64981CCA47}" type="datetimeFigureOut">
               <a:rPr lang="fr-FR" smtClean="0"/>
-              <a:t>23/07/2019</a:t>
+              <a:t>25/07/2019</a:t>
             </a:fld>
             <a:endParaRPr lang="fr-FR"/>
           </a:p>
@@ -436,7 +847,7 @@
           <a:p>
             <a:fld id="{78A2FE73-68E3-7348-8EDE-3D64981CCA47}" type="datetimeFigureOut">
               <a:rPr lang="fr-FR" smtClean="0"/>
-              <a:t>23/07/2019</a:t>
+              <a:t>25/07/2019</a:t>
             </a:fld>
             <a:endParaRPr lang="fr-FR"/>
           </a:p>
@@ -619,7 +1030,7 @@
           <a:p>
             <a:fld id="{78A2FE73-68E3-7348-8EDE-3D64981CCA47}" type="datetimeFigureOut">
               <a:rPr lang="fr-FR" smtClean="0"/>
-              <a:t>23/07/2019</a:t>
+              <a:t>25/07/2019</a:t>
             </a:fld>
             <a:endParaRPr lang="fr-FR"/>
           </a:p>
@@ -792,7 +1203,7 @@
           <a:p>
             <a:fld id="{78A2FE73-68E3-7348-8EDE-3D64981CCA47}" type="datetimeFigureOut">
               <a:rPr lang="fr-FR" smtClean="0"/>
-              <a:t>23/07/2019</a:t>
+              <a:t>25/07/2019</a:t>
             </a:fld>
             <a:endParaRPr lang="fr-FR"/>
           </a:p>
@@ -1070,7 +1481,7 @@
           <a:p>
             <a:fld id="{78A2FE73-68E3-7348-8EDE-3D64981CCA47}" type="datetimeFigureOut">
               <a:rPr lang="fr-FR" smtClean="0"/>
-              <a:t>23/07/2019</a:t>
+              <a:t>25/07/2019</a:t>
             </a:fld>
             <a:endParaRPr lang="fr-FR"/>
           </a:p>
@@ -1285,7 +1696,7 @@
           <a:p>
             <a:fld id="{78A2FE73-68E3-7348-8EDE-3D64981CCA47}" type="datetimeFigureOut">
               <a:rPr lang="fr-FR" smtClean="0"/>
-              <a:t>23/07/2019</a:t>
+              <a:t>25/07/2019</a:t>
             </a:fld>
             <a:endParaRPr lang="fr-FR"/>
           </a:p>
@@ -1653,7 +2064,7 @@
           <a:p>
             <a:fld id="{78A2FE73-68E3-7348-8EDE-3D64981CCA47}" type="datetimeFigureOut">
               <a:rPr lang="fr-FR" smtClean="0"/>
-              <a:t>23/07/2019</a:t>
+              <a:t>25/07/2019</a:t>
             </a:fld>
             <a:endParaRPr lang="fr-FR"/>
           </a:p>
@@ -1794,7 +2205,7 @@
           <a:p>
             <a:fld id="{78A2FE73-68E3-7348-8EDE-3D64981CCA47}" type="datetimeFigureOut">
               <a:rPr lang="fr-FR" smtClean="0"/>
-              <a:t>23/07/2019</a:t>
+              <a:t>25/07/2019</a:t>
             </a:fld>
             <a:endParaRPr lang="fr-FR"/>
           </a:p>
@@ -1907,7 +2318,7 @@
           <a:p>
             <a:fld id="{78A2FE73-68E3-7348-8EDE-3D64981CCA47}" type="datetimeFigureOut">
               <a:rPr lang="fr-FR" smtClean="0"/>
-              <a:t>23/07/2019</a:t>
+              <a:t>25/07/2019</a:t>
             </a:fld>
             <a:endParaRPr lang="fr-FR"/>
           </a:p>
@@ -2196,7 +2607,7 @@
           <a:p>
             <a:fld id="{78A2FE73-68E3-7348-8EDE-3D64981CCA47}" type="datetimeFigureOut">
               <a:rPr lang="fr-FR" smtClean="0"/>
-              <a:t>23/07/2019</a:t>
+              <a:t>25/07/2019</a:t>
             </a:fld>
             <a:endParaRPr lang="fr-FR"/>
           </a:p>
@@ -2487,7 +2898,7 @@
           <a:p>
             <a:fld id="{78A2FE73-68E3-7348-8EDE-3D64981CCA47}" type="datetimeFigureOut">
               <a:rPr lang="fr-FR" smtClean="0"/>
-              <a:t>23/07/2019</a:t>
+              <a:t>25/07/2019</a:t>
             </a:fld>
             <a:endParaRPr lang="fr-FR"/>
           </a:p>
@@ -2703,7 +3114,7 @@
           <a:p>
             <a:fld id="{78A2FE73-68E3-7348-8EDE-3D64981CCA47}" type="datetimeFigureOut">
               <a:rPr lang="fr-FR" smtClean="0"/>
-              <a:t>23/07/2019</a:t>
+              <a:t>25/07/2019</a:t>
             </a:fld>
             <a:endParaRPr lang="fr-FR"/>
           </a:p>
@@ -3361,7 +3772,7 @@
       <p:cxnSp>
         <p:nvCxnSpPr>
           <p:cNvPr id="7" name="Connecteur en arc 6">
-            <a:hlinkClick r:id="rId2"/>
+            <a:hlinkClick r:id="rId3"/>
             <a:extLst>
               <a:ext uri="{FF2B5EF4-FFF2-40B4-BE49-F238E27FC236}">
                 <a16:creationId xmlns:a16="http://schemas.microsoft.com/office/drawing/2014/main" id="{C4EDCE7F-D1EB-7F44-A0DE-7F26892476D1}"/>
@@ -3523,7 +3934,7 @@
       <p:cxnSp>
         <p:nvCxnSpPr>
           <p:cNvPr id="18" name="Connecteur en arc 17">
-            <a:hlinkClick r:id="rId2"/>
+            <a:hlinkClick r:id="rId3"/>
             <a:extLst>
               <a:ext uri="{FF2B5EF4-FFF2-40B4-BE49-F238E27FC236}">
                 <a16:creationId xmlns:a16="http://schemas.microsoft.com/office/drawing/2014/main" id="{3F46A0CE-CB76-F847-AF46-FD928FC28107}"/>
@@ -3640,7 +4051,7 @@
       <p:cxnSp>
         <p:nvCxnSpPr>
           <p:cNvPr id="23" name="Connecteur en arc 22">
-            <a:hlinkClick r:id="rId2"/>
+            <a:hlinkClick r:id="rId3"/>
             <a:extLst>
               <a:ext uri="{FF2B5EF4-FFF2-40B4-BE49-F238E27FC236}">
                 <a16:creationId xmlns:a16="http://schemas.microsoft.com/office/drawing/2014/main" id="{E281D6DD-F4F3-654F-B8E1-115DB323152A}"/>
@@ -3697,7 +4108,7 @@
         </p:nvSpPr>
         <p:spPr>
           <a:xfrm>
-            <a:off x="2018320" y="5784520"/>
+            <a:off x="363400" y="6072596"/>
             <a:ext cx="1828800" cy="323385"/>
           </a:xfrm>
           <a:prstGeom prst="roundRect">
@@ -3760,7 +4171,7 @@
       <p:cxnSp>
         <p:nvCxnSpPr>
           <p:cNvPr id="27" name="Connecteur en arc 26">
-            <a:hlinkClick r:id="rId2"/>
+            <a:hlinkClick r:id="rId3"/>
             <a:extLst>
               <a:ext uri="{FF2B5EF4-FFF2-40B4-BE49-F238E27FC236}">
                 <a16:creationId xmlns:a16="http://schemas.microsoft.com/office/drawing/2014/main" id="{1F910176-E9DB-CB49-B053-E4129E189AD5}"/>
@@ -3877,7 +4288,7 @@
       <p:cxnSp>
         <p:nvCxnSpPr>
           <p:cNvPr id="33" name="Connecteur en arc 32">
-            <a:hlinkClick r:id="rId2"/>
+            <a:hlinkClick r:id="rId3"/>
             <a:extLst>
               <a:ext uri="{FF2B5EF4-FFF2-40B4-BE49-F238E27FC236}">
                 <a16:creationId xmlns:a16="http://schemas.microsoft.com/office/drawing/2014/main" id="{34ED36B0-375E-0F4C-A10C-1DB4FB6B1CF1}"/>
@@ -4050,7 +4461,7 @@
       <p:cxnSp>
         <p:nvCxnSpPr>
           <p:cNvPr id="41" name="Connecteur en arc 40">
-            <a:hlinkClick r:id="rId2"/>
+            <a:hlinkClick r:id="rId3"/>
             <a:extLst>
               <a:ext uri="{FF2B5EF4-FFF2-40B4-BE49-F238E27FC236}">
                 <a16:creationId xmlns:a16="http://schemas.microsoft.com/office/drawing/2014/main" id="{7B87247A-8A1D-E047-8539-4454C5963844}"/>
@@ -4094,7 +4505,7 @@
       <p:cxnSp>
         <p:nvCxnSpPr>
           <p:cNvPr id="46" name="Connecteur en arc 45">
-            <a:hlinkClick r:id="rId2"/>
+            <a:hlinkClick r:id="rId3"/>
             <a:extLst>
               <a:ext uri="{FF2B5EF4-FFF2-40B4-BE49-F238E27FC236}">
                 <a16:creationId xmlns:a16="http://schemas.microsoft.com/office/drawing/2014/main" id="{F44964AA-CEFB-5145-880D-7B5374570E3E}"/>
@@ -4109,15 +4520,12 @@
           <p:nvPr/>
         </p:nvCxnSpPr>
         <p:spPr>
-          <a:xfrm rot="10800000" flipH="1" flipV="1">
-            <a:off x="1660556" y="4962088"/>
-            <a:ext cx="1272164" cy="822432"/>
-          </a:xfrm>
-          <a:prstGeom prst="curvedConnector4">
-            <a:avLst>
-              <a:gd name="adj1" fmla="val -17969"/>
-              <a:gd name="adj2" fmla="val 59830"/>
-            </a:avLst>
+          <a:xfrm rot="10800000" flipV="1">
+            <a:off x="1277800" y="4962088"/>
+            <a:ext cx="382756" cy="1110508"/>
+          </a:xfrm>
+          <a:prstGeom prst="curvedConnector2">
+            <a:avLst/>
           </a:prstGeom>
           <a:ln>
             <a:solidFill>
@@ -4233,7 +4641,7 @@
         </p:nvSpPr>
         <p:spPr>
           <a:xfrm>
-            <a:off x="6600730" y="5629637"/>
+            <a:off x="7609822" y="5622545"/>
             <a:ext cx="1828800" cy="323385"/>
           </a:xfrm>
           <a:prstGeom prst="roundRect">
@@ -4293,7 +4701,7 @@
       <p:cxnSp>
         <p:nvCxnSpPr>
           <p:cNvPr id="52" name="Connecteur en arc 51">
-            <a:hlinkClick r:id="rId2"/>
+            <a:hlinkClick r:id="rId3"/>
             <a:extLst>
               <a:ext uri="{FF2B5EF4-FFF2-40B4-BE49-F238E27FC236}">
                 <a16:creationId xmlns:a16="http://schemas.microsoft.com/office/drawing/2014/main" id="{B6966C21-63A1-B348-9B4A-79A4CCBB4E26}"/>
@@ -4303,14 +4711,14 @@
           <p:cNvCxnSpPr>
             <a:cxnSpLocks/>
             <a:stCxn id="26" idx="3"/>
-            <a:endCxn id="51" idx="1"/>
+            <a:endCxn id="79" idx="1"/>
           </p:cNvCxnSpPr>
           <p:nvPr/>
         </p:nvCxnSpPr>
         <p:spPr>
           <a:xfrm flipV="1">
-            <a:off x="3847120" y="5791330"/>
-            <a:ext cx="2753610" cy="154883"/>
+            <a:off x="2192200" y="5644300"/>
+            <a:ext cx="434950" cy="589989"/>
           </a:xfrm>
           <a:prstGeom prst="curvedConnector3">
             <a:avLst>
@@ -4339,7 +4747,7 @@
       <p:cxnSp>
         <p:nvCxnSpPr>
           <p:cNvPr id="55" name="Connecteur en arc 54">
-            <a:hlinkClick r:id="rId2"/>
+            <a:hlinkClick r:id="rId3"/>
             <a:extLst>
               <a:ext uri="{FF2B5EF4-FFF2-40B4-BE49-F238E27FC236}">
                 <a16:creationId xmlns:a16="http://schemas.microsoft.com/office/drawing/2014/main" id="{D1FDD4A7-1849-2C43-A441-35577782C8C9}"/>
@@ -4355,8 +4763,8 @@
         </p:nvCxnSpPr>
         <p:spPr>
           <a:xfrm rot="5400000" flipH="1" flipV="1">
-            <a:off x="7679514" y="4296011"/>
-            <a:ext cx="1169243" cy="1498011"/>
+            <a:off x="8187606" y="4797011"/>
+            <a:ext cx="1162151" cy="488919"/>
           </a:xfrm>
           <a:prstGeom prst="curvedConnector3">
             <a:avLst>
@@ -4396,7 +4804,7 @@
         </p:nvSpPr>
         <p:spPr>
           <a:xfrm>
-            <a:off x="7888452" y="4708172"/>
+            <a:off x="8549597" y="4777611"/>
             <a:ext cx="1088760" cy="253916"/>
           </a:xfrm>
           <a:prstGeom prst="rect">
@@ -4503,7 +4911,7 @@
       <p:cxnSp>
         <p:nvCxnSpPr>
           <p:cNvPr id="60" name="Connecteur en arc 59">
-            <a:hlinkClick r:id="rId2"/>
+            <a:hlinkClick r:id="rId3"/>
             <a:extLst>
               <a:ext uri="{FF2B5EF4-FFF2-40B4-BE49-F238E27FC236}">
                 <a16:creationId xmlns:a16="http://schemas.microsoft.com/office/drawing/2014/main" id="{9F00CE53-FCCB-844D-896F-5D58F579B000}"/>
@@ -4620,7 +5028,7 @@
       <p:cxnSp>
         <p:nvCxnSpPr>
           <p:cNvPr id="64" name="Connecteur en arc 63">
-            <a:hlinkClick r:id="rId2"/>
+            <a:hlinkClick r:id="rId3"/>
             <a:extLst>
               <a:ext uri="{FF2B5EF4-FFF2-40B4-BE49-F238E27FC236}">
                 <a16:creationId xmlns:a16="http://schemas.microsoft.com/office/drawing/2014/main" id="{D02F9BE0-B521-F748-B945-5B299A3E69E5}"/>
@@ -4742,7 +5150,7 @@
       <p:cxnSp>
         <p:nvCxnSpPr>
           <p:cNvPr id="68" name="Connecteur en arc 67">
-            <a:hlinkClick r:id="rId2"/>
+            <a:hlinkClick r:id="rId3"/>
             <a:extLst>
               <a:ext uri="{FF2B5EF4-FFF2-40B4-BE49-F238E27FC236}">
                 <a16:creationId xmlns:a16="http://schemas.microsoft.com/office/drawing/2014/main" id="{11DE2CEF-0B30-2242-B758-1B72DBB3D164}"/>
@@ -4916,7 +5324,7 @@
       <p:cxnSp>
         <p:nvCxnSpPr>
           <p:cNvPr id="73" name="Connecteur en arc 72">
-            <a:hlinkClick r:id="rId2"/>
+            <a:hlinkClick r:id="rId3"/>
             <a:extLst>
               <a:ext uri="{FF2B5EF4-FFF2-40B4-BE49-F238E27FC236}">
                 <a16:creationId xmlns:a16="http://schemas.microsoft.com/office/drawing/2014/main" id="{C4DD5097-42CF-1249-ACFC-DD4D30E82788}"/>
@@ -4969,7 +5377,7 @@
       <p:cxnSp>
         <p:nvCxnSpPr>
           <p:cNvPr id="76" name="Connecteur en arc 75">
-            <a:hlinkClick r:id="rId2"/>
+            <a:hlinkClick r:id="rId3"/>
             <a:extLst>
               <a:ext uri="{FF2B5EF4-FFF2-40B4-BE49-F238E27FC236}">
                 <a16:creationId xmlns:a16="http://schemas.microsoft.com/office/drawing/2014/main" id="{9A61D4D8-8C54-AF46-85A7-6F217E8D71AE}"/>
@@ -5064,7 +5472,7 @@
       <p:cxnSp>
         <p:nvCxnSpPr>
           <p:cNvPr id="82" name="Connecteur en arc 81">
-            <a:hlinkClick r:id="rId2"/>
+            <a:hlinkClick r:id="rId3"/>
             <a:extLst>
               <a:ext uri="{FF2B5EF4-FFF2-40B4-BE49-F238E27FC236}">
                 <a16:creationId xmlns:a16="http://schemas.microsoft.com/office/drawing/2014/main" id="{C90EFA44-C9F1-3342-B12A-D520D273E9D2}"/>
@@ -5179,7 +5587,7 @@
       <p:cxnSp>
         <p:nvCxnSpPr>
           <p:cNvPr id="95" name="Connecteur en arc 94">
-            <a:hlinkClick r:id="rId2"/>
+            <a:hlinkClick r:id="rId3"/>
             <a:extLst>
               <a:ext uri="{FF2B5EF4-FFF2-40B4-BE49-F238E27FC236}">
                 <a16:creationId xmlns:a16="http://schemas.microsoft.com/office/drawing/2014/main" id="{890E8682-A8F1-FA4A-BF04-E1598B645BC8}"/>
@@ -5195,8 +5603,8 @@
         </p:nvCxnSpPr>
         <p:spPr>
           <a:xfrm rot="16200000" flipV="1">
-            <a:off x="5410021" y="3524528"/>
-            <a:ext cx="3139679" cy="1070540"/>
+            <a:off x="5918113" y="3016436"/>
+            <a:ext cx="3132587" cy="2079632"/>
           </a:xfrm>
           <a:prstGeom prst="curvedConnector3">
             <a:avLst>
@@ -5225,7 +5633,7 @@
       <p:cxnSp>
         <p:nvCxnSpPr>
           <p:cNvPr id="99" name="Connecteur en arc 98">
-            <a:hlinkClick r:id="rId2"/>
+            <a:hlinkClick r:id="rId3"/>
             <a:extLst>
               <a:ext uri="{FF2B5EF4-FFF2-40B4-BE49-F238E27FC236}">
                 <a16:creationId xmlns:a16="http://schemas.microsoft.com/office/drawing/2014/main" id="{CC83A007-F17C-A94D-9FE3-B273FB0888C7}"/>
@@ -5460,7 +5868,7 @@
       <p:cxnSp>
         <p:nvCxnSpPr>
           <p:cNvPr id="111" name="Connecteur en arc 110">
-            <a:hlinkClick r:id="rId2"/>
+            <a:hlinkClick r:id="rId3"/>
             <a:extLst>
               <a:ext uri="{FF2B5EF4-FFF2-40B4-BE49-F238E27FC236}">
                 <a16:creationId xmlns:a16="http://schemas.microsoft.com/office/drawing/2014/main" id="{F102693F-A1A0-974C-B89A-87C53862C21E}"/>
@@ -5512,7 +5920,7 @@
       <p:cxnSp>
         <p:nvCxnSpPr>
           <p:cNvPr id="121" name="Connecteur en arc 120">
-            <a:hlinkClick r:id="rId2"/>
+            <a:hlinkClick r:id="rId3"/>
             <a:extLst>
               <a:ext uri="{FF2B5EF4-FFF2-40B4-BE49-F238E27FC236}">
                 <a16:creationId xmlns:a16="http://schemas.microsoft.com/office/drawing/2014/main" id="{E03CABAF-2D53-504E-BC6A-EE61E9C23C67}"/>
@@ -5528,8 +5936,8 @@
         </p:nvCxnSpPr>
         <p:spPr>
           <a:xfrm rot="16200000" flipH="1">
-            <a:off x="6357672" y="4472179"/>
-            <a:ext cx="814412" cy="1500504"/>
+            <a:off x="6865764" y="3964087"/>
+            <a:ext cx="807320" cy="2509596"/>
           </a:xfrm>
           <a:prstGeom prst="curvedConnector3">
             <a:avLst>
@@ -5925,7 +6333,7 @@
         </p:nvSpPr>
         <p:spPr>
           <a:xfrm>
-            <a:off x="2827252" y="5327192"/>
+            <a:off x="285517" y="5390384"/>
             <a:ext cx="1750800" cy="253916"/>
           </a:xfrm>
           <a:prstGeom prst="rect">
@@ -6123,7 +6531,7 @@
       <p:cxnSp>
         <p:nvCxnSpPr>
           <p:cNvPr id="62" name="Connecteur en arc 61">
-            <a:hlinkClick r:id="rId2"/>
+            <a:hlinkClick r:id="rId3"/>
             <a:extLst>
               <a:ext uri="{FF2B5EF4-FFF2-40B4-BE49-F238E27FC236}">
                 <a16:creationId xmlns:a16="http://schemas.microsoft.com/office/drawing/2014/main" id="{B53E27D7-74C0-464C-925B-18D0E53BB9D3}"/>
@@ -6172,7 +6580,7 @@
       <p:cxnSp>
         <p:nvCxnSpPr>
           <p:cNvPr id="65" name="Connecteur en arc 64">
-            <a:hlinkClick r:id="rId2"/>
+            <a:hlinkClick r:id="rId3"/>
             <a:extLst>
               <a:ext uri="{FF2B5EF4-FFF2-40B4-BE49-F238E27FC236}">
                 <a16:creationId xmlns:a16="http://schemas.microsoft.com/office/drawing/2014/main" id="{800B4C00-A0E1-9243-B5E9-BBAAE6439D0A}"/>
@@ -6354,96 +6762,6 @@
           </a:p>
         </p:txBody>
       </p:sp>
-      <p:cxnSp>
-        <p:nvCxnSpPr>
-          <p:cNvPr id="12" name="Connecteur droit 11">
-            <a:extLst>
-              <a:ext uri="{FF2B5EF4-FFF2-40B4-BE49-F238E27FC236}">
-                <a16:creationId xmlns:a16="http://schemas.microsoft.com/office/drawing/2014/main" id="{89D44C90-C238-BD46-B149-FD4BAD10C9FC}"/>
-              </a:ext>
-            </a:extLst>
-          </p:cNvPr>
-          <p:cNvCxnSpPr/>
-          <p:nvPr/>
-        </p:nvCxnSpPr>
-        <p:spPr>
-          <a:xfrm>
-            <a:off x="4802038" y="5516219"/>
-            <a:ext cx="108776" cy="859986"/>
-          </a:xfrm>
-          <a:prstGeom prst="line">
-            <a:avLst/>
-          </a:prstGeom>
-          <a:ln w="9525" cap="flat" cmpd="sng" algn="ctr">
-            <a:solidFill>
-              <a:schemeClr val="dk1"/>
-            </a:solidFill>
-            <a:prstDash val="dash"/>
-            <a:round/>
-            <a:headEnd type="none" w="med" len="med"/>
-            <a:tailEnd type="none" w="med" len="med"/>
-          </a:ln>
-        </p:spPr>
-        <p:style>
-          <a:lnRef idx="0">
-            <a:scrgbClr r="0" g="0" b="0"/>
-          </a:lnRef>
-          <a:fillRef idx="0">
-            <a:scrgbClr r="0" g="0" b="0"/>
-          </a:fillRef>
-          <a:effectRef idx="0">
-            <a:scrgbClr r="0" g="0" b="0"/>
-          </a:effectRef>
-          <a:fontRef idx="minor">
-            <a:schemeClr val="tx1"/>
-          </a:fontRef>
-        </p:style>
-      </p:cxnSp>
-      <p:cxnSp>
-        <p:nvCxnSpPr>
-          <p:cNvPr id="74" name="Connecteur droit 73">
-            <a:extLst>
-              <a:ext uri="{FF2B5EF4-FFF2-40B4-BE49-F238E27FC236}">
-                <a16:creationId xmlns:a16="http://schemas.microsoft.com/office/drawing/2014/main" id="{1861901B-2DC6-C144-9D65-4CA3F17C5B6C}"/>
-              </a:ext>
-            </a:extLst>
-          </p:cNvPr>
-          <p:cNvCxnSpPr/>
-          <p:nvPr/>
-        </p:nvCxnSpPr>
-        <p:spPr>
-          <a:xfrm>
-            <a:off x="4876128" y="5518454"/>
-            <a:ext cx="108776" cy="859986"/>
-          </a:xfrm>
-          <a:prstGeom prst="line">
-            <a:avLst/>
-          </a:prstGeom>
-          <a:ln w="9525" cap="flat" cmpd="sng" algn="ctr">
-            <a:solidFill>
-              <a:schemeClr val="dk1"/>
-            </a:solidFill>
-            <a:prstDash val="dash"/>
-            <a:round/>
-            <a:headEnd type="none" w="med" len="med"/>
-            <a:tailEnd type="none" w="med" len="med"/>
-          </a:ln>
-        </p:spPr>
-        <p:style>
-          <a:lnRef idx="0">
-            <a:scrgbClr r="0" g="0" b="0"/>
-          </a:lnRef>
-          <a:fillRef idx="0">
-            <a:scrgbClr r="0" g="0" b="0"/>
-          </a:fillRef>
-          <a:effectRef idx="0">
-            <a:scrgbClr r="0" g="0" b="0"/>
-          </a:effectRef>
-          <a:fontRef idx="minor">
-            <a:schemeClr val="tx1"/>
-          </a:fontRef>
-        </p:style>
-      </p:cxnSp>
       <p:sp>
         <p:nvSpPr>
           <p:cNvPr id="75" name="Rectangle à coins arrondis 74">
@@ -6627,7 +6945,7 @@
       <p:cxnSp>
         <p:nvCxnSpPr>
           <p:cNvPr id="85" name="Connecteur en arc 84">
-            <a:hlinkClick r:id="rId2"/>
+            <a:hlinkClick r:id="rId3"/>
             <a:extLst>
               <a:ext uri="{FF2B5EF4-FFF2-40B4-BE49-F238E27FC236}">
                 <a16:creationId xmlns:a16="http://schemas.microsoft.com/office/drawing/2014/main" id="{5332FDEF-8451-7F44-BF78-730425CB5BAD}"/>
@@ -6720,7 +7038,7 @@
       <p:cxnSp>
         <p:nvCxnSpPr>
           <p:cNvPr id="77" name="Connecteur en arc 76">
-            <a:hlinkClick r:id="rId2"/>
+            <a:hlinkClick r:id="rId3"/>
             <a:extLst>
               <a:ext uri="{FF2B5EF4-FFF2-40B4-BE49-F238E27FC236}">
                 <a16:creationId xmlns:a16="http://schemas.microsoft.com/office/drawing/2014/main" id="{5071FAC8-7DFB-6C45-82B0-ED7CDEDFD4E7}"/>
@@ -6798,6 +7116,745 @@
                 </a:solidFill>
               </a:rPr>
               <a:t>goBack</a:t>
+            </a:r>
+            <a:r>
+              <a:rPr lang="fr-FR" sz="1050" dirty="0"/>
+              <a:t>()</a:t>
+            </a:r>
+            <a:endParaRPr lang="fr-FR" dirty="0"/>
+          </a:p>
+        </p:txBody>
+      </p:sp>
+      <p:sp>
+        <p:nvSpPr>
+          <p:cNvPr id="79" name="Rectangle à coins arrondis 78">
+            <a:extLst>
+              <a:ext uri="{FF2B5EF4-FFF2-40B4-BE49-F238E27FC236}">
+                <a16:creationId xmlns:a16="http://schemas.microsoft.com/office/drawing/2014/main" id="{D584E110-76A1-1944-BD37-99627DDF4967}"/>
+              </a:ext>
+            </a:extLst>
+          </p:cNvPr>
+          <p:cNvSpPr/>
+          <p:nvPr/>
+        </p:nvSpPr>
+        <p:spPr>
+          <a:xfrm>
+            <a:off x="2627150" y="5482607"/>
+            <a:ext cx="1828800" cy="323385"/>
+          </a:xfrm>
+          <a:prstGeom prst="roundRect">
+            <a:avLst/>
+          </a:prstGeom>
+          <a:solidFill>
+            <a:schemeClr val="accent4">
+              <a:lumMod val="20000"/>
+              <a:lumOff val="80000"/>
+            </a:schemeClr>
+          </a:solidFill>
+          <a:ln>
+            <a:solidFill>
+              <a:schemeClr val="accent4">
+                <a:lumMod val="50000"/>
+              </a:schemeClr>
+            </a:solidFill>
+          </a:ln>
+        </p:spPr>
+        <p:style>
+          <a:lnRef idx="2">
+            <a:schemeClr val="accent1">
+              <a:shade val="50000"/>
+            </a:schemeClr>
+          </a:lnRef>
+          <a:fillRef idx="1">
+            <a:schemeClr val="accent1"/>
+          </a:fillRef>
+          <a:effectRef idx="0">
+            <a:schemeClr val="accent1"/>
+          </a:effectRef>
+          <a:fontRef idx="minor">
+            <a:schemeClr val="lt1"/>
+          </a:fontRef>
+        </p:style>
+        <p:txBody>
+          <a:bodyPr rtlCol="0" anchor="ctr"/>
+          <a:lstStyle/>
+          <a:p>
+            <a:pPr algn="ctr"/>
+            <a:r>
+              <a:rPr lang="fr-FR" sz="1200" dirty="0" err="1">
+                <a:solidFill>
+                  <a:schemeClr val="tx1"/>
+                </a:solidFill>
+              </a:rPr>
+              <a:t>environnementSearching</a:t>
+            </a:r>
+            <a:endParaRPr lang="fr-FR" sz="1200" dirty="0">
+              <a:solidFill>
+                <a:schemeClr val="tx1"/>
+              </a:solidFill>
+            </a:endParaRPr>
+          </a:p>
+        </p:txBody>
+      </p:sp>
+      <p:sp>
+        <p:nvSpPr>
+          <p:cNvPr id="80" name="Rectangle à coins arrondis 79">
+            <a:extLst>
+              <a:ext uri="{FF2B5EF4-FFF2-40B4-BE49-F238E27FC236}">
+                <a16:creationId xmlns:a16="http://schemas.microsoft.com/office/drawing/2014/main" id="{01517218-3A24-3648-B4ED-5DDA2A38199C}"/>
+              </a:ext>
+            </a:extLst>
+          </p:cNvPr>
+          <p:cNvSpPr/>
+          <p:nvPr/>
+        </p:nvSpPr>
+        <p:spPr>
+          <a:xfrm>
+            <a:off x="3837992" y="6364542"/>
+            <a:ext cx="2077284" cy="323385"/>
+          </a:xfrm>
+          <a:prstGeom prst="roundRect">
+            <a:avLst/>
+          </a:prstGeom>
+          <a:solidFill>
+            <a:schemeClr val="accent6">
+              <a:lumMod val="40000"/>
+              <a:lumOff val="60000"/>
+            </a:schemeClr>
+          </a:solidFill>
+          <a:ln>
+            <a:solidFill>
+              <a:schemeClr val="accent6">
+                <a:lumMod val="75000"/>
+              </a:schemeClr>
+            </a:solidFill>
+          </a:ln>
+        </p:spPr>
+        <p:style>
+          <a:lnRef idx="2">
+            <a:schemeClr val="accent1">
+              <a:shade val="50000"/>
+            </a:schemeClr>
+          </a:lnRef>
+          <a:fillRef idx="1">
+            <a:schemeClr val="accent1"/>
+          </a:fillRef>
+          <a:effectRef idx="0">
+            <a:schemeClr val="accent1"/>
+          </a:effectRef>
+          <a:fontRef idx="minor">
+            <a:schemeClr val="lt1"/>
+          </a:fontRef>
+        </p:style>
+        <p:txBody>
+          <a:bodyPr rtlCol="0" anchor="ctr"/>
+          <a:lstStyle/>
+          <a:p>
+            <a:pPr algn="ctr"/>
+            <a:r>
+              <a:rPr lang="fr-FR" sz="1200" dirty="0" err="1">
+                <a:solidFill>
+                  <a:schemeClr val="tx1"/>
+                </a:solidFill>
+              </a:rPr>
+              <a:t>environnementSelectionForm</a:t>
+            </a:r>
+            <a:endParaRPr lang="fr-FR" dirty="0">
+              <a:solidFill>
+                <a:schemeClr val="tx1"/>
+              </a:solidFill>
+            </a:endParaRPr>
+          </a:p>
+        </p:txBody>
+      </p:sp>
+      <p:cxnSp>
+        <p:nvCxnSpPr>
+          <p:cNvPr id="86" name="Connecteur en arc 85">
+            <a:hlinkClick r:id="rId3"/>
+            <a:extLst>
+              <a:ext uri="{FF2B5EF4-FFF2-40B4-BE49-F238E27FC236}">
+                <a16:creationId xmlns:a16="http://schemas.microsoft.com/office/drawing/2014/main" id="{9DED57FC-65FA-394B-AA1A-4A299D8EDAED}"/>
+              </a:ext>
+            </a:extLst>
+          </p:cNvPr>
+          <p:cNvCxnSpPr>
+            <a:cxnSpLocks/>
+            <a:stCxn id="28" idx="3"/>
+            <a:endCxn id="103" idx="1"/>
+          </p:cNvCxnSpPr>
+          <p:nvPr/>
+        </p:nvCxnSpPr>
+        <p:spPr>
+          <a:xfrm>
+            <a:off x="5047552" y="5622545"/>
+            <a:ext cx="3319716" cy="965695"/>
+          </a:xfrm>
+          <a:prstGeom prst="curvedConnector3">
+            <a:avLst>
+              <a:gd name="adj1" fmla="val 50000"/>
+            </a:avLst>
+          </a:prstGeom>
+          <a:ln>
+            <a:tailEnd type="triangle"/>
+          </a:ln>
+        </p:spPr>
+        <p:style>
+          <a:lnRef idx="1">
+            <a:schemeClr val="accent1"/>
+          </a:lnRef>
+          <a:fillRef idx="0">
+            <a:schemeClr val="accent1"/>
+          </a:fillRef>
+          <a:effectRef idx="0">
+            <a:schemeClr val="accent1"/>
+          </a:effectRef>
+          <a:fontRef idx="minor">
+            <a:schemeClr val="tx1"/>
+          </a:fontRef>
+        </p:style>
+      </p:cxnSp>
+      <p:sp>
+        <p:nvSpPr>
+          <p:cNvPr id="87" name="ZoneTexte 86">
+            <a:extLst>
+              <a:ext uri="{FF2B5EF4-FFF2-40B4-BE49-F238E27FC236}">
+                <a16:creationId xmlns:a16="http://schemas.microsoft.com/office/drawing/2014/main" id="{3E4B8D5D-C43B-034E-8F5E-F8656997B3FC}"/>
+              </a:ext>
+            </a:extLst>
+          </p:cNvPr>
+          <p:cNvSpPr txBox="1"/>
+          <p:nvPr/>
+        </p:nvSpPr>
+        <p:spPr>
+          <a:xfrm>
+            <a:off x="5408784" y="5651079"/>
+            <a:ext cx="1441420" cy="253916"/>
+          </a:xfrm>
+          <a:prstGeom prst="rect">
+            <a:avLst/>
+          </a:prstGeom>
+          <a:noFill/>
+        </p:spPr>
+        <p:txBody>
+          <a:bodyPr wrap="none" rtlCol="0">
+            <a:spAutoFit/>
+          </a:bodyPr>
+          <a:lstStyle/>
+          <a:p>
+            <a:r>
+              <a:rPr lang="fr-FR" sz="1050" dirty="0" err="1">
+                <a:solidFill>
+                  <a:schemeClr val="accent1"/>
+                </a:solidFill>
+              </a:rPr>
+              <a:t>doSelectEnvironment</a:t>
+            </a:r>
+            <a:r>
+              <a:rPr lang="fr-FR" sz="1050" dirty="0"/>
+              <a:t>()</a:t>
+            </a:r>
+            <a:endParaRPr lang="fr-FR" dirty="0"/>
+          </a:p>
+        </p:txBody>
+      </p:sp>
+      <p:cxnSp>
+        <p:nvCxnSpPr>
+          <p:cNvPr id="88" name="Connecteur en arc 87">
+            <a:hlinkClick r:id="rId3"/>
+            <a:extLst>
+              <a:ext uri="{FF2B5EF4-FFF2-40B4-BE49-F238E27FC236}">
+                <a16:creationId xmlns:a16="http://schemas.microsoft.com/office/drawing/2014/main" id="{3D3FB627-7777-F240-9585-4FD52AF07D06}"/>
+              </a:ext>
+            </a:extLst>
+          </p:cNvPr>
+          <p:cNvCxnSpPr>
+            <a:cxnSpLocks/>
+            <a:stCxn id="80" idx="3"/>
+            <a:endCxn id="103" idx="1"/>
+          </p:cNvCxnSpPr>
+          <p:nvPr/>
+        </p:nvCxnSpPr>
+        <p:spPr>
+          <a:xfrm>
+            <a:off x="5915276" y="6526235"/>
+            <a:ext cx="2451992" cy="62005"/>
+          </a:xfrm>
+          <a:prstGeom prst="curvedConnector3">
+            <a:avLst>
+              <a:gd name="adj1" fmla="val 50000"/>
+            </a:avLst>
+          </a:prstGeom>
+          <a:ln>
+            <a:tailEnd type="triangle"/>
+          </a:ln>
+        </p:spPr>
+        <p:style>
+          <a:lnRef idx="1">
+            <a:schemeClr val="accent1"/>
+          </a:lnRef>
+          <a:fillRef idx="0">
+            <a:schemeClr val="accent1"/>
+          </a:fillRef>
+          <a:effectRef idx="0">
+            <a:schemeClr val="accent1"/>
+          </a:effectRef>
+          <a:fontRef idx="minor">
+            <a:schemeClr val="tx1"/>
+          </a:fontRef>
+        </p:style>
+      </p:cxnSp>
+      <p:sp>
+        <p:nvSpPr>
+          <p:cNvPr id="28" name="Losange 27">
+            <a:extLst>
+              <a:ext uri="{FF2B5EF4-FFF2-40B4-BE49-F238E27FC236}">
+                <a16:creationId xmlns:a16="http://schemas.microsoft.com/office/drawing/2014/main" id="{1FD38896-EBEB-2D49-969C-D708484E329A}"/>
+              </a:ext>
+            </a:extLst>
+          </p:cNvPr>
+          <p:cNvSpPr/>
+          <p:nvPr/>
+        </p:nvSpPr>
+        <p:spPr>
+          <a:xfrm>
+            <a:off x="4749186" y="5482607"/>
+            <a:ext cx="298366" cy="279876"/>
+          </a:xfrm>
+          <a:prstGeom prst="diamond">
+            <a:avLst/>
+          </a:prstGeom>
+        </p:spPr>
+        <p:style>
+          <a:lnRef idx="2">
+            <a:schemeClr val="accent1">
+              <a:shade val="50000"/>
+            </a:schemeClr>
+          </a:lnRef>
+          <a:fillRef idx="1">
+            <a:schemeClr val="accent1"/>
+          </a:fillRef>
+          <a:effectRef idx="0">
+            <a:schemeClr val="accent1"/>
+          </a:effectRef>
+          <a:fontRef idx="minor">
+            <a:schemeClr val="lt1"/>
+          </a:fontRef>
+        </p:style>
+        <p:txBody>
+          <a:bodyPr rtlCol="0" anchor="ctr"/>
+          <a:lstStyle/>
+          <a:p>
+            <a:pPr algn="ctr"/>
+            <a:endParaRPr lang="fr-FR"/>
+          </a:p>
+        </p:txBody>
+      </p:sp>
+      <p:cxnSp>
+        <p:nvCxnSpPr>
+          <p:cNvPr id="91" name="Connecteur en arc 90">
+            <a:hlinkClick r:id="rId3"/>
+            <a:extLst>
+              <a:ext uri="{FF2B5EF4-FFF2-40B4-BE49-F238E27FC236}">
+                <a16:creationId xmlns:a16="http://schemas.microsoft.com/office/drawing/2014/main" id="{1C8E896D-5790-F246-8F86-408D28EC6223}"/>
+              </a:ext>
+            </a:extLst>
+          </p:cNvPr>
+          <p:cNvCxnSpPr>
+            <a:cxnSpLocks/>
+            <a:stCxn id="28" idx="2"/>
+            <a:endCxn id="80" idx="0"/>
+          </p:cNvCxnSpPr>
+          <p:nvPr/>
+        </p:nvCxnSpPr>
+        <p:spPr>
+          <a:xfrm rot="5400000">
+            <a:off x="4586473" y="6052645"/>
+            <a:ext cx="602059" cy="21735"/>
+          </a:xfrm>
+          <a:prstGeom prst="curvedConnector3">
+            <a:avLst>
+              <a:gd name="adj1" fmla="val 50000"/>
+            </a:avLst>
+          </a:prstGeom>
+          <a:ln>
+            <a:tailEnd type="triangle"/>
+          </a:ln>
+        </p:spPr>
+        <p:style>
+          <a:lnRef idx="1">
+            <a:schemeClr val="accent1"/>
+          </a:lnRef>
+          <a:fillRef idx="0">
+            <a:schemeClr val="accent1"/>
+          </a:fillRef>
+          <a:effectRef idx="0">
+            <a:schemeClr val="accent1"/>
+          </a:effectRef>
+          <a:fontRef idx="minor">
+            <a:schemeClr val="tx1"/>
+          </a:fontRef>
+        </p:style>
+      </p:cxnSp>
+      <p:cxnSp>
+        <p:nvCxnSpPr>
+          <p:cNvPr id="44" name="Connecteur droit 43">
+            <a:extLst>
+              <a:ext uri="{FF2B5EF4-FFF2-40B4-BE49-F238E27FC236}">
+                <a16:creationId xmlns:a16="http://schemas.microsoft.com/office/drawing/2014/main" id="{9FFF3F1D-9E59-3649-8117-E8D684426B5E}"/>
+              </a:ext>
+            </a:extLst>
+          </p:cNvPr>
+          <p:cNvCxnSpPr>
+            <a:stCxn id="79" idx="3"/>
+            <a:endCxn id="28" idx="1"/>
+          </p:cNvCxnSpPr>
+          <p:nvPr/>
+        </p:nvCxnSpPr>
+        <p:spPr>
+          <a:xfrm flipV="1">
+            <a:off x="4455950" y="5622545"/>
+            <a:ext cx="293236" cy="21755"/>
+          </a:xfrm>
+          <a:prstGeom prst="line">
+            <a:avLst/>
+          </a:prstGeom>
+        </p:spPr>
+        <p:style>
+          <a:lnRef idx="1">
+            <a:schemeClr val="accent1"/>
+          </a:lnRef>
+          <a:fillRef idx="0">
+            <a:schemeClr val="accent1"/>
+          </a:fillRef>
+          <a:effectRef idx="0">
+            <a:schemeClr val="accent1"/>
+          </a:effectRef>
+          <a:fontRef idx="minor">
+            <a:schemeClr val="tx1"/>
+          </a:fontRef>
+        </p:style>
+      </p:cxnSp>
+      <p:sp>
+        <p:nvSpPr>
+          <p:cNvPr id="100" name="ZoneTexte 99">
+            <a:extLst>
+              <a:ext uri="{FF2B5EF4-FFF2-40B4-BE49-F238E27FC236}">
+                <a16:creationId xmlns:a16="http://schemas.microsoft.com/office/drawing/2014/main" id="{F7DAE456-86C2-BB47-BCB6-91A67FDA0A1B}"/>
+              </a:ext>
+            </a:extLst>
+          </p:cNvPr>
+          <p:cNvSpPr txBox="1"/>
+          <p:nvPr/>
+        </p:nvSpPr>
+        <p:spPr>
+          <a:xfrm>
+            <a:off x="4438787" y="5885106"/>
+            <a:ext cx="813043" cy="253916"/>
+          </a:xfrm>
+          <a:prstGeom prst="rect">
+            <a:avLst/>
+          </a:prstGeom>
+          <a:noFill/>
+        </p:spPr>
+        <p:txBody>
+          <a:bodyPr wrap="none" rtlCol="0">
+            <a:spAutoFit/>
+          </a:bodyPr>
+          <a:lstStyle/>
+          <a:p>
+            <a:r>
+              <a:rPr lang="fr-FR" sz="1050" dirty="0" err="1">
+                <a:solidFill>
+                  <a:schemeClr val="tx1">
+                    <a:lumMod val="50000"/>
+                    <a:lumOff val="50000"/>
+                  </a:schemeClr>
+                </a:solidFill>
+              </a:rPr>
+              <a:t>Env</a:t>
+            </a:r>
+            <a:r>
+              <a:rPr lang="fr-FR" sz="1050" dirty="0">
+                <a:solidFill>
+                  <a:schemeClr val="tx1">
+                    <a:lumMod val="50000"/>
+                    <a:lumOff val="50000"/>
+                  </a:schemeClr>
+                </a:solidFill>
+              </a:rPr>
+              <a:t> size &gt; 1</a:t>
+            </a:r>
+            <a:endParaRPr lang="fr-FR" dirty="0">
+              <a:solidFill>
+                <a:schemeClr val="tx1">
+                  <a:lumMod val="50000"/>
+                  <a:lumOff val="50000"/>
+                </a:schemeClr>
+              </a:solidFill>
+            </a:endParaRPr>
+          </a:p>
+        </p:txBody>
+      </p:sp>
+      <p:sp>
+        <p:nvSpPr>
+          <p:cNvPr id="101" name="ZoneTexte 100">
+            <a:extLst>
+              <a:ext uri="{FF2B5EF4-FFF2-40B4-BE49-F238E27FC236}">
+                <a16:creationId xmlns:a16="http://schemas.microsoft.com/office/drawing/2014/main" id="{65675FA1-4F09-C446-B1AF-4FB4C5A158C6}"/>
+              </a:ext>
+            </a:extLst>
+          </p:cNvPr>
+          <p:cNvSpPr txBox="1"/>
+          <p:nvPr/>
+        </p:nvSpPr>
+        <p:spPr>
+          <a:xfrm>
+            <a:off x="5061792" y="5390592"/>
+            <a:ext cx="813043" cy="253916"/>
+          </a:xfrm>
+          <a:prstGeom prst="rect">
+            <a:avLst/>
+          </a:prstGeom>
+          <a:noFill/>
+        </p:spPr>
+        <p:txBody>
+          <a:bodyPr wrap="none" rtlCol="0">
+            <a:spAutoFit/>
+          </a:bodyPr>
+          <a:lstStyle/>
+          <a:p>
+            <a:r>
+              <a:rPr lang="fr-FR" sz="1050" dirty="0" err="1">
+                <a:solidFill>
+                  <a:schemeClr val="tx1">
+                    <a:lumMod val="50000"/>
+                    <a:lumOff val="50000"/>
+                  </a:schemeClr>
+                </a:solidFill>
+              </a:rPr>
+              <a:t>Env</a:t>
+            </a:r>
+            <a:r>
+              <a:rPr lang="fr-FR" sz="1050" dirty="0">
+                <a:solidFill>
+                  <a:schemeClr val="tx1">
+                    <a:lumMod val="50000"/>
+                    <a:lumOff val="50000"/>
+                  </a:schemeClr>
+                </a:solidFill>
+              </a:rPr>
+              <a:t> size = 1</a:t>
+            </a:r>
+            <a:endParaRPr lang="fr-FR" dirty="0">
+              <a:solidFill>
+                <a:schemeClr val="tx1">
+                  <a:lumMod val="50000"/>
+                  <a:lumOff val="50000"/>
+                </a:schemeClr>
+              </a:solidFill>
+            </a:endParaRPr>
+          </a:p>
+        </p:txBody>
+      </p:sp>
+      <p:sp>
+        <p:nvSpPr>
+          <p:cNvPr id="102" name="ZoneTexte 101">
+            <a:extLst>
+              <a:ext uri="{FF2B5EF4-FFF2-40B4-BE49-F238E27FC236}">
+                <a16:creationId xmlns:a16="http://schemas.microsoft.com/office/drawing/2014/main" id="{26ECB550-E565-F94A-8840-1DB4B3BE031D}"/>
+              </a:ext>
+            </a:extLst>
+          </p:cNvPr>
+          <p:cNvSpPr txBox="1"/>
+          <p:nvPr/>
+        </p:nvSpPr>
+        <p:spPr>
+          <a:xfrm>
+            <a:off x="6389771" y="6557237"/>
+            <a:ext cx="1441420" cy="253916"/>
+          </a:xfrm>
+          <a:prstGeom prst="rect">
+            <a:avLst/>
+          </a:prstGeom>
+          <a:noFill/>
+        </p:spPr>
+        <p:txBody>
+          <a:bodyPr wrap="none" rtlCol="0">
+            <a:spAutoFit/>
+          </a:bodyPr>
+          <a:lstStyle/>
+          <a:p>
+            <a:r>
+              <a:rPr lang="fr-FR" sz="1050" dirty="0" err="1">
+                <a:solidFill>
+                  <a:schemeClr val="accent1"/>
+                </a:solidFill>
+              </a:rPr>
+              <a:t>doSelectEnvironment</a:t>
+            </a:r>
+            <a:r>
+              <a:rPr lang="fr-FR" sz="1050" dirty="0"/>
+              <a:t>()</a:t>
+            </a:r>
+            <a:endParaRPr lang="fr-FR" dirty="0"/>
+          </a:p>
+        </p:txBody>
+      </p:sp>
+      <p:sp>
+        <p:nvSpPr>
+          <p:cNvPr id="103" name="Rectangle à coins arrondis 102">
+            <a:extLst>
+              <a:ext uri="{FF2B5EF4-FFF2-40B4-BE49-F238E27FC236}">
+                <a16:creationId xmlns:a16="http://schemas.microsoft.com/office/drawing/2014/main" id="{D71C1FD8-6EBC-5F49-B34A-064B1F601E8B}"/>
+              </a:ext>
+            </a:extLst>
+          </p:cNvPr>
+          <p:cNvSpPr/>
+          <p:nvPr/>
+        </p:nvSpPr>
+        <p:spPr>
+          <a:xfrm>
+            <a:off x="8367268" y="6426547"/>
+            <a:ext cx="1992887" cy="323385"/>
+          </a:xfrm>
+          <a:prstGeom prst="roundRect">
+            <a:avLst/>
+          </a:prstGeom>
+          <a:solidFill>
+            <a:schemeClr val="bg2"/>
+          </a:solidFill>
+          <a:ln>
+            <a:solidFill>
+              <a:schemeClr val="bg2">
+                <a:lumMod val="25000"/>
+              </a:schemeClr>
+            </a:solidFill>
+          </a:ln>
+        </p:spPr>
+        <p:style>
+          <a:lnRef idx="2">
+            <a:schemeClr val="accent1">
+              <a:shade val="50000"/>
+            </a:schemeClr>
+          </a:lnRef>
+          <a:fillRef idx="1">
+            <a:schemeClr val="accent1"/>
+          </a:fillRef>
+          <a:effectRef idx="0">
+            <a:schemeClr val="accent1"/>
+          </a:effectRef>
+          <a:fontRef idx="minor">
+            <a:schemeClr val="lt1"/>
+          </a:fontRef>
+        </p:style>
+        <p:txBody>
+          <a:bodyPr rtlCol="0" anchor="ctr"/>
+          <a:lstStyle/>
+          <a:p>
+            <a:pPr algn="ctr"/>
+            <a:r>
+              <a:rPr lang="fr-FR" sz="1200" dirty="0" err="1">
+                <a:solidFill>
+                  <a:schemeClr val="tx1">
+                    <a:lumMod val="50000"/>
+                    <a:lumOff val="50000"/>
+                  </a:schemeClr>
+                </a:solidFill>
+              </a:rPr>
+              <a:t>environmentSelected</a:t>
+            </a:r>
+            <a:endParaRPr lang="fr-FR" sz="1200" dirty="0">
+              <a:solidFill>
+                <a:schemeClr val="tx1">
+                  <a:lumMod val="50000"/>
+                  <a:lumOff val="50000"/>
+                </a:schemeClr>
+              </a:solidFill>
+            </a:endParaRPr>
+          </a:p>
+        </p:txBody>
+      </p:sp>
+      <p:cxnSp>
+        <p:nvCxnSpPr>
+          <p:cNvPr id="112" name="Connecteur en arc 111">
+            <a:hlinkClick r:id="rId3"/>
+            <a:extLst>
+              <a:ext uri="{FF2B5EF4-FFF2-40B4-BE49-F238E27FC236}">
+                <a16:creationId xmlns:a16="http://schemas.microsoft.com/office/drawing/2014/main" id="{37D038AB-3BA2-3243-929E-BF66C3D5FA4D}"/>
+              </a:ext>
+            </a:extLst>
+          </p:cNvPr>
+          <p:cNvCxnSpPr>
+            <a:cxnSpLocks/>
+            <a:stCxn id="103" idx="0"/>
+            <a:endCxn id="51" idx="2"/>
+          </p:cNvCxnSpPr>
+          <p:nvPr/>
+        </p:nvCxnSpPr>
+        <p:spPr>
+          <a:xfrm rot="16200000" flipV="1">
+            <a:off x="8703659" y="5766494"/>
+            <a:ext cx="480617" cy="839490"/>
+          </a:xfrm>
+          <a:prstGeom prst="curvedConnector3">
+            <a:avLst>
+              <a:gd name="adj1" fmla="val 50000"/>
+            </a:avLst>
+          </a:prstGeom>
+          <a:ln>
+            <a:tailEnd type="triangle"/>
+          </a:ln>
+        </p:spPr>
+        <p:style>
+          <a:lnRef idx="1">
+            <a:schemeClr val="accent1"/>
+          </a:lnRef>
+          <a:fillRef idx="0">
+            <a:schemeClr val="accent1"/>
+          </a:fillRef>
+          <a:effectRef idx="0">
+            <a:schemeClr val="accent1"/>
+          </a:effectRef>
+          <a:fontRef idx="minor">
+            <a:schemeClr val="tx1"/>
+          </a:fontRef>
+        </p:style>
+      </p:cxnSp>
+      <p:sp>
+        <p:nvSpPr>
+          <p:cNvPr id="114" name="ZoneTexte 113">
+            <a:extLst>
+              <a:ext uri="{FF2B5EF4-FFF2-40B4-BE49-F238E27FC236}">
+                <a16:creationId xmlns:a16="http://schemas.microsoft.com/office/drawing/2014/main" id="{34A65C8D-A121-C741-BCC1-6185CCF532C2}"/>
+              </a:ext>
+            </a:extLst>
+          </p:cNvPr>
+          <p:cNvSpPr txBox="1"/>
+          <p:nvPr/>
+        </p:nvSpPr>
+        <p:spPr>
+          <a:xfrm>
+            <a:off x="3230843" y="6103847"/>
+            <a:ext cx="1604927" cy="253916"/>
+          </a:xfrm>
+          <a:prstGeom prst="rect">
+            <a:avLst/>
+          </a:prstGeom>
+          <a:noFill/>
+        </p:spPr>
+        <p:txBody>
+          <a:bodyPr wrap="none" rtlCol="0">
+            <a:spAutoFit/>
+          </a:bodyPr>
+          <a:lstStyle/>
+          <a:p>
+            <a:r>
+              <a:rPr lang="fr-FR" sz="1050" dirty="0" err="1">
+                <a:solidFill>
+                  <a:schemeClr val="accent1"/>
+                </a:solidFill>
+              </a:rPr>
+              <a:t>onEnvironmentsFetched</a:t>
             </a:r>
             <a:r>
               <a:rPr lang="fr-FR" sz="1050" dirty="0"/>
@@ -8801,4 +9858,299 @@
     </a:ext>
   </a:extLst>
 </a:theme>
+</file>
+
+<file path=ppt/theme/theme2.xml><?xml version="1.0" encoding="utf-8"?>
+<a:theme xmlns:a="http://schemas.openxmlformats.org/drawingml/2006/main" name="Thème Office">
+  <a:themeElements>
+    <a:clrScheme name="Office">
+      <a:dk1>
+        <a:sysClr val="windowText" lastClr="000000"/>
+      </a:dk1>
+      <a:lt1>
+        <a:sysClr val="window" lastClr="FFFFFF"/>
+      </a:lt1>
+      <a:dk2>
+        <a:srgbClr val="44546A"/>
+      </a:dk2>
+      <a:lt2>
+        <a:srgbClr val="E7E6E6"/>
+      </a:lt2>
+      <a:accent1>
+        <a:srgbClr val="4472C4"/>
+      </a:accent1>
+      <a:accent2>
+        <a:srgbClr val="ED7D31"/>
+      </a:accent2>
+      <a:accent3>
+        <a:srgbClr val="A5A5A5"/>
+      </a:accent3>
+      <a:accent4>
+        <a:srgbClr val="FFC000"/>
+      </a:accent4>
+      <a:accent5>
+        <a:srgbClr val="5B9BD5"/>
+      </a:accent5>
+      <a:accent6>
+        <a:srgbClr val="70AD47"/>
+      </a:accent6>
+      <a:hlink>
+        <a:srgbClr val="0563C1"/>
+      </a:hlink>
+      <a:folHlink>
+        <a:srgbClr val="954F72"/>
+      </a:folHlink>
+    </a:clrScheme>
+    <a:fontScheme name="Office">
+      <a:majorFont>
+        <a:latin typeface="Calibri Light" panose="020F0302020204030204"/>
+        <a:ea typeface=""/>
+        <a:cs typeface=""/>
+        <a:font script="Jpan" typeface="游ゴシック Light"/>
+        <a:font script="Hang" typeface="맑은 고딕"/>
+        <a:font script="Hans" typeface="等线 Light"/>
+        <a:font script="Hant" typeface="新細明體"/>
+        <a:font script="Arab" typeface="Times New Roman"/>
+        <a:font script="Hebr" typeface="Times New Roman"/>
+        <a:font script="Thai" typeface="Angsana New"/>
+        <a:font script="Ethi" typeface="Nyala"/>
+        <a:font script="Beng" typeface="Vrinda"/>
+        <a:font script="Gujr" typeface="Shruti"/>
+        <a:font script="Khmr" typeface="MoolBoran"/>
+        <a:font script="Knda" typeface="Tunga"/>
+        <a:font script="Guru" typeface="Raavi"/>
+        <a:font script="Cans" typeface="Euphemia"/>
+        <a:font script="Cher" typeface="Plantagenet Cherokee"/>
+        <a:font script="Yiii" typeface="Microsoft Yi Baiti"/>
+        <a:font script="Tibt" typeface="Microsoft Himalaya"/>
+        <a:font script="Thaa" typeface="MV Boli"/>
+        <a:font script="Deva" typeface="Mangal"/>
+        <a:font script="Telu" typeface="Gautami"/>
+        <a:font script="Taml" typeface="Latha"/>
+        <a:font script="Syrc" typeface="Estrangelo Edessa"/>
+        <a:font script="Orya" typeface="Kalinga"/>
+        <a:font script="Mlym" typeface="Kartika"/>
+        <a:font script="Laoo" typeface="DokChampa"/>
+        <a:font script="Sinh" typeface="Iskoola Pota"/>
+        <a:font script="Mong" typeface="Mongolian Baiti"/>
+        <a:font script="Viet" typeface="Times New Roman"/>
+        <a:font script="Uigh" typeface="Microsoft Uighur"/>
+        <a:font script="Geor" typeface="Sylfaen"/>
+        <a:font script="Armn" typeface="Arial"/>
+        <a:font script="Bugi" typeface="Leelawadee UI"/>
+        <a:font script="Bopo" typeface="Microsoft JhengHei"/>
+        <a:font script="Java" typeface="Javanese Text"/>
+        <a:font script="Lisu" typeface="Segoe UI"/>
+        <a:font script="Mymr" typeface="Myanmar Text"/>
+        <a:font script="Nkoo" typeface="Ebrima"/>
+        <a:font script="Olck" typeface="Nirmala UI"/>
+        <a:font script="Osma" typeface="Ebrima"/>
+        <a:font script="Phag" typeface="Phagspa"/>
+        <a:font script="Syrn" typeface="Estrangelo Edessa"/>
+        <a:font script="Syrj" typeface="Estrangelo Edessa"/>
+        <a:font script="Syre" typeface="Estrangelo Edessa"/>
+        <a:font script="Sora" typeface="Nirmala UI"/>
+        <a:font script="Tale" typeface="Microsoft Tai Le"/>
+        <a:font script="Talu" typeface="Microsoft New Tai Lue"/>
+        <a:font script="Tfng" typeface="Ebrima"/>
+      </a:majorFont>
+      <a:minorFont>
+        <a:latin typeface="Calibri" panose="020F0502020204030204"/>
+        <a:ea typeface=""/>
+        <a:cs typeface=""/>
+        <a:font script="Jpan" typeface="游ゴシック"/>
+        <a:font script="Hang" typeface="맑은 고딕"/>
+        <a:font script="Hans" typeface="等线"/>
+        <a:font script="Hant" typeface="新細明體"/>
+        <a:font script="Arab" typeface="Arial"/>
+        <a:font script="Hebr" typeface="Arial"/>
+        <a:font script="Thai" typeface="Cordia New"/>
+        <a:font script="Ethi" typeface="Nyala"/>
+        <a:font script="Beng" typeface="Vrinda"/>
+        <a:font script="Gujr" typeface="Shruti"/>
+        <a:font script="Khmr" typeface="DaunPenh"/>
+        <a:font script="Knda" typeface="Tunga"/>
+        <a:font script="Guru" typeface="Raavi"/>
+        <a:font script="Cans" typeface="Euphemia"/>
+        <a:font script="Cher" typeface="Plantagenet Cherokee"/>
+        <a:font script="Yiii" typeface="Microsoft Yi Baiti"/>
+        <a:font script="Tibt" typeface="Microsoft Himalaya"/>
+        <a:font script="Thaa" typeface="MV Boli"/>
+        <a:font script="Deva" typeface="Mangal"/>
+        <a:font script="Telu" typeface="Gautami"/>
+        <a:font script="Taml" typeface="Latha"/>
+        <a:font script="Syrc" typeface="Estrangelo Edessa"/>
+        <a:font script="Orya" typeface="Kalinga"/>
+        <a:font script="Mlym" typeface="Kartika"/>
+        <a:font script="Laoo" typeface="DokChampa"/>
+        <a:font script="Sinh" typeface="Iskoola Pota"/>
+        <a:font script="Mong" typeface="Mongolian Baiti"/>
+        <a:font script="Viet" typeface="Arial"/>
+        <a:font script="Uigh" typeface="Microsoft Uighur"/>
+        <a:font script="Geor" typeface="Sylfaen"/>
+        <a:font script="Armn" typeface="Arial"/>
+        <a:font script="Bugi" typeface="Leelawadee UI"/>
+        <a:font script="Bopo" typeface="Microsoft JhengHei"/>
+        <a:font script="Java" typeface="Javanese Text"/>
+        <a:font script="Lisu" typeface="Segoe UI"/>
+        <a:font script="Mymr" typeface="Myanmar Text"/>
+        <a:font script="Nkoo" typeface="Ebrima"/>
+        <a:font script="Olck" typeface="Nirmala UI"/>
+        <a:font script="Osma" typeface="Ebrima"/>
+        <a:font script="Phag" typeface="Phagspa"/>
+        <a:font script="Syrn" typeface="Estrangelo Edessa"/>
+        <a:font script="Syrj" typeface="Estrangelo Edessa"/>
+        <a:font script="Syre" typeface="Estrangelo Edessa"/>
+        <a:font script="Sora" typeface="Nirmala UI"/>
+        <a:font script="Tale" typeface="Microsoft Tai Le"/>
+        <a:font script="Talu" typeface="Microsoft New Tai Lue"/>
+        <a:font script="Tfng" typeface="Ebrima"/>
+      </a:minorFont>
+    </a:fontScheme>
+    <a:fmtScheme name="Office">
+      <a:fillStyleLst>
+        <a:solidFill>
+          <a:schemeClr val="phClr"/>
+        </a:solidFill>
+        <a:gradFill rotWithShape="1">
+          <a:gsLst>
+            <a:gs pos="0">
+              <a:schemeClr val="phClr">
+                <a:lumMod val="110000"/>
+                <a:satMod val="105000"/>
+                <a:tint val="67000"/>
+              </a:schemeClr>
+            </a:gs>
+            <a:gs pos="50000">
+              <a:schemeClr val="phClr">
+                <a:lumMod val="105000"/>
+                <a:satMod val="103000"/>
+                <a:tint val="73000"/>
+              </a:schemeClr>
+            </a:gs>
+            <a:gs pos="100000">
+              <a:schemeClr val="phClr">
+                <a:lumMod val="105000"/>
+                <a:satMod val="109000"/>
+                <a:tint val="81000"/>
+              </a:schemeClr>
+            </a:gs>
+          </a:gsLst>
+          <a:lin ang="5400000" scaled="0"/>
+        </a:gradFill>
+        <a:gradFill rotWithShape="1">
+          <a:gsLst>
+            <a:gs pos="0">
+              <a:schemeClr val="phClr">
+                <a:satMod val="103000"/>
+                <a:lumMod val="102000"/>
+                <a:tint val="94000"/>
+              </a:schemeClr>
+            </a:gs>
+            <a:gs pos="50000">
+              <a:schemeClr val="phClr">
+                <a:satMod val="110000"/>
+                <a:lumMod val="100000"/>
+                <a:shade val="100000"/>
+              </a:schemeClr>
+            </a:gs>
+            <a:gs pos="100000">
+              <a:schemeClr val="phClr">
+                <a:lumMod val="99000"/>
+                <a:satMod val="120000"/>
+                <a:shade val="78000"/>
+              </a:schemeClr>
+            </a:gs>
+          </a:gsLst>
+          <a:lin ang="5400000" scaled="0"/>
+        </a:gradFill>
+      </a:fillStyleLst>
+      <a:lnStyleLst>
+        <a:ln w="6350" cap="flat" cmpd="sng" algn="ctr">
+          <a:solidFill>
+            <a:schemeClr val="phClr"/>
+          </a:solidFill>
+          <a:prstDash val="solid"/>
+          <a:miter lim="800000"/>
+        </a:ln>
+        <a:ln w="12700" cap="flat" cmpd="sng" algn="ctr">
+          <a:solidFill>
+            <a:schemeClr val="phClr"/>
+          </a:solidFill>
+          <a:prstDash val="solid"/>
+          <a:miter lim="800000"/>
+        </a:ln>
+        <a:ln w="19050" cap="flat" cmpd="sng" algn="ctr">
+          <a:solidFill>
+            <a:schemeClr val="phClr"/>
+          </a:solidFill>
+          <a:prstDash val="solid"/>
+          <a:miter lim="800000"/>
+        </a:ln>
+      </a:lnStyleLst>
+      <a:effectStyleLst>
+        <a:effectStyle>
+          <a:effectLst/>
+        </a:effectStyle>
+        <a:effectStyle>
+          <a:effectLst/>
+        </a:effectStyle>
+        <a:effectStyle>
+          <a:effectLst>
+            <a:outerShdw blurRad="57150" dist="19050" dir="5400000" algn="ctr" rotWithShape="0">
+              <a:srgbClr val="000000">
+                <a:alpha val="63000"/>
+              </a:srgbClr>
+            </a:outerShdw>
+          </a:effectLst>
+        </a:effectStyle>
+      </a:effectStyleLst>
+      <a:bgFillStyleLst>
+        <a:solidFill>
+          <a:schemeClr val="phClr"/>
+        </a:solidFill>
+        <a:solidFill>
+          <a:schemeClr val="phClr">
+            <a:tint val="95000"/>
+            <a:satMod val="170000"/>
+          </a:schemeClr>
+        </a:solidFill>
+        <a:gradFill rotWithShape="1">
+          <a:gsLst>
+            <a:gs pos="0">
+              <a:schemeClr val="phClr">
+                <a:tint val="93000"/>
+                <a:satMod val="150000"/>
+                <a:shade val="98000"/>
+                <a:lumMod val="102000"/>
+              </a:schemeClr>
+            </a:gs>
+            <a:gs pos="50000">
+              <a:schemeClr val="phClr">
+                <a:tint val="98000"/>
+                <a:satMod val="130000"/>
+                <a:shade val="90000"/>
+                <a:lumMod val="103000"/>
+              </a:schemeClr>
+            </a:gs>
+            <a:gs pos="100000">
+              <a:schemeClr val="phClr">
+                <a:shade val="63000"/>
+                <a:satMod val="120000"/>
+              </a:schemeClr>
+            </a:gs>
+          </a:gsLst>
+          <a:lin ang="5400000" scaled="0"/>
+        </a:gradFill>
+      </a:bgFillStyleLst>
+    </a:fmtScheme>
+  </a:themeElements>
+  <a:objectDefaults/>
+  <a:extraClrSchemeLst/>
+  <a:extLst>
+    <a:ext uri="{05A4C25C-085E-4340-85A3-A5531E510DB2}">
+      <thm15:themeFamily xmlns:thm15="http://schemas.microsoft.com/office/thememl/2012/main" name="Office Theme" id="{62F939B6-93AF-4DB8-9C6B-D6C7DFDC589F}" vid="{4A3C46E8-61CC-4603-A589-7422A47A8E4A}"/>
+    </a:ext>
+  </a:extLst>
+</a:theme>
 </file>
</xml_diff>

<commit_message>
Add style management : now we can pick a theme, we can use theme dependent css classes
</commit_message>
<xml_diff>
--- a/alien4cloud-wizard-ui/doc/WIzardStateMachine.pptx
+++ b/alien4cloud-wizard-ui/doc/WIzardStateMachine.pptx
@@ -6197,21 +6197,29 @@
           <a:bodyPr wrap="none" rtlCol="0">
             <a:spAutoFit/>
           </a:bodyPr>
-          <a:lstStyle/>
-          <a:p>
-            <a:r>
-              <a:rPr lang="fr-FR" sz="1050" dirty="0" err="1">
+          <a:lstStyle>
+            <a:defPPr>
+              <a:defRPr lang="fr-FR"/>
+            </a:defPPr>
+            <a:lvl1pPr>
+              <a:defRPr sz="1050">
                 <a:solidFill>
-                  <a:srgbClr val="FF0000"/>
+                  <a:schemeClr val="accent6">
+                    <a:lumMod val="75000"/>
+                  </a:schemeClr>
                 </a:solidFill>
-              </a:rPr>
+              </a:defRPr>
+            </a:lvl1pPr>
+          </a:lstStyle>
+          <a:p>
+            <a:r>
+              <a:rPr lang="fr-FR" dirty="0" err="1"/>
               <a:t>onTargetSelected</a:t>
             </a:r>
             <a:r>
-              <a:rPr lang="fr-FR" sz="1050" dirty="0"/>
+              <a:rPr lang="fr-FR" dirty="0"/>
               <a:t>()</a:t>
             </a:r>
-            <a:endParaRPr lang="fr-FR" dirty="0"/>
           </a:p>
         </p:txBody>
       </p:sp>
@@ -7286,8 +7294,8 @@
         </p:nvCxnSpPr>
         <p:spPr>
           <a:xfrm>
-            <a:off x="5047552" y="5622545"/>
-            <a:ext cx="3319716" cy="965695"/>
+            <a:off x="4817873" y="5655333"/>
+            <a:ext cx="3549395" cy="932907"/>
           </a:xfrm>
           <a:prstGeom prst="curvedConnector3">
             <a:avLst>
@@ -7417,7 +7425,7 @@
         </p:nvSpPr>
         <p:spPr>
           <a:xfrm>
-            <a:off x="4749186" y="5482607"/>
+            <a:off x="4519507" y="5515395"/>
             <a:ext cx="298366" cy="279876"/>
           </a:xfrm>
           <a:prstGeom prst="diamond">
@@ -7467,9 +7475,9 @@
           <p:nvPr/>
         </p:nvCxnSpPr>
         <p:spPr>
-          <a:xfrm rot="5400000">
-            <a:off x="4586473" y="6052645"/>
-            <a:ext cx="602059" cy="21735"/>
+          <a:xfrm rot="16200000" flipH="1">
+            <a:off x="4488027" y="5975934"/>
+            <a:ext cx="569271" cy="207944"/>
           </a:xfrm>
           <a:prstGeom prst="curvedConnector3">
             <a:avLst>
@@ -7511,9 +7519,9 @@
           <p:nvPr/>
         </p:nvCxnSpPr>
         <p:spPr>
-          <a:xfrm flipV="1">
-            <a:off x="4455950" y="5622545"/>
-            <a:ext cx="293236" cy="21755"/>
+          <a:xfrm>
+            <a:off x="4455950" y="5644300"/>
+            <a:ext cx="63557" cy="11033"/>
           </a:xfrm>
           <a:prstGeom prst="line">
             <a:avLst/>

</xml_diff>